<commit_message>
feat: Add test images and fix typo
</commit_message>
<xml_diff>
--- a/etep/apresentação-tcc.pptx
+++ b/etep/apresentação-tcc.pptx
@@ -138,7 +138,7 @@
                 </a:uFill>
                 <a:latin typeface="Times New Roman"/>
               </a:rPr>
-              <a:t> </a:t>
+              <a:t>&lt;header&gt;</a:t>
             </a:r>
             <a:endParaRPr b="0" lang="en-US" sz="1400" spc="-1" strike="noStrike">
               <a:solidFill>
@@ -189,7 +189,7 @@
                 </a:uFill>
                 <a:latin typeface="Times New Roman"/>
               </a:rPr>
-              <a:t> </a:t>
+              <a:t>&lt;date/time&gt;</a:t>
             </a:r>
             <a:endParaRPr b="0" lang="en-US" sz="1400" spc="-1" strike="noStrike">
               <a:solidFill>
@@ -239,7 +239,7 @@
                 </a:uFill>
                 <a:latin typeface="Times New Roman"/>
               </a:rPr>
-              <a:t> </a:t>
+              <a:t>&lt;footer&gt;</a:t>
             </a:r>
             <a:endParaRPr b="0" lang="en-US" sz="1400" spc="-1" strike="noStrike">
               <a:solidFill>
@@ -278,7 +278,7 @@
           <a:bodyPr lIns="0" rIns="0" tIns="0" bIns="0" anchor="b"/>
           <a:p>
             <a:pPr algn="r"/>
-            <a:fld id="{BA270124-E6F7-49FA-874A-4590F6FA20E9}" type="slidenum">
+            <a:fld id="{C8F65B6D-45BB-41A3-8010-121F460867CF}" type="slidenum">
               <a:rPr b="0" lang="en-US" sz="1400" spc="-1" strike="noStrike">
                 <a:solidFill>
                   <a:srgbClr val="000000"/>
@@ -290,7 +290,7 @@
                 </a:uFill>
                 <a:latin typeface="Times New Roman"/>
               </a:rPr>
-              <a:t>1</a:t>
+              <a:t>&lt;number&gt;</a:t>
             </a:fld>
             <a:endParaRPr b="0" lang="en-US" sz="1400" spc="-1" strike="noStrike">
               <a:solidFill>
@@ -342,7 +342,7 @@
         <p:spPr>
           <a:xfrm>
             <a:off x="685800" y="4400640"/>
-            <a:ext cx="5484960" cy="3598920"/>
+            <a:ext cx="5484600" cy="3598560"/>
           </a:xfrm>
           <a:prstGeom prst="rect">
             <a:avLst/>
@@ -374,7 +374,7 @@
         <p:spPr>
           <a:xfrm>
             <a:off x="3884760" y="8685360"/>
-            <a:ext cx="2970360" cy="457200"/>
+            <a:ext cx="2970000" cy="456840"/>
           </a:xfrm>
           <a:prstGeom prst="rect">
             <a:avLst/>
@@ -398,7 +398,7 @@
                 <a:spcPct val="100000"/>
               </a:lnSpc>
             </a:pPr>
-            <a:fld id="{548219EC-0356-414C-8A4B-61519DC35EEE}" type="slidenum">
+            <a:fld id="{695B54A6-59BC-4790-B04D-1A02C297BC63}" type="slidenum">
               <a:rPr b="0" lang="en-US" sz="1200" spc="-1" strike="noStrike">
                 <a:solidFill>
                   <a:srgbClr val="000000"/>
@@ -484,7 +484,7 @@
         <p:spPr>
           <a:xfrm>
             <a:off x="457200" y="273600"/>
-            <a:ext cx="8228880" cy="1144440"/>
+            <a:ext cx="8228520" cy="1144080"/>
           </a:xfrm>
           <a:prstGeom prst="rect">
             <a:avLst/>
@@ -521,7 +521,7 @@
         <p:spPr>
           <a:xfrm>
             <a:off x="457200" y="1604520"/>
-            <a:ext cx="4015440" cy="904320"/>
+            <a:ext cx="1959120" cy="430920"/>
           </a:xfrm>
           <a:prstGeom prst="rect">
             <a:avLst/>
@@ -556,8 +556,8 @@
         </p:nvSpPr>
         <p:spPr>
           <a:xfrm>
-            <a:off x="457200" y="2595240"/>
-            <a:ext cx="4015440" cy="904320"/>
+            <a:off x="457200" y="2076840"/>
+            <a:ext cx="1959120" cy="430920"/>
           </a:xfrm>
           <a:prstGeom prst="rect">
             <a:avLst/>
@@ -615,7 +615,7 @@
         <p:spPr>
           <a:xfrm>
             <a:off x="457200" y="273600"/>
-            <a:ext cx="8228880" cy="1144440"/>
+            <a:ext cx="8228520" cy="1144080"/>
           </a:xfrm>
           <a:prstGeom prst="rect">
             <a:avLst/>
@@ -652,7 +652,7 @@
         <p:spPr>
           <a:xfrm>
             <a:off x="457200" y="1604520"/>
-            <a:ext cx="1959480" cy="904320"/>
+            <a:ext cx="955800" cy="430920"/>
           </a:xfrm>
           <a:prstGeom prst="rect">
             <a:avLst/>
@@ -687,8 +687,8 @@
         </p:nvSpPr>
         <p:spPr>
           <a:xfrm>
-            <a:off x="2514960" y="1604520"/>
-            <a:ext cx="1959480" cy="904320"/>
+            <a:off x="1461240" y="1604520"/>
+            <a:ext cx="955800" cy="430920"/>
           </a:xfrm>
           <a:prstGeom prst="rect">
             <a:avLst/>
@@ -723,8 +723,8 @@
         </p:nvSpPr>
         <p:spPr>
           <a:xfrm>
-            <a:off x="2514960" y="2595240"/>
-            <a:ext cx="1959480" cy="904320"/>
+            <a:off x="1461240" y="2076840"/>
+            <a:ext cx="955800" cy="430920"/>
           </a:xfrm>
           <a:prstGeom prst="rect">
             <a:avLst/>
@@ -759,8 +759,8 @@
         </p:nvSpPr>
         <p:spPr>
           <a:xfrm>
-            <a:off x="457200" y="2595240"/>
-            <a:ext cx="1959480" cy="904320"/>
+            <a:off x="457200" y="2076840"/>
+            <a:ext cx="955800" cy="430920"/>
           </a:xfrm>
           <a:prstGeom prst="rect">
             <a:avLst/>
@@ -818,7 +818,7 @@
         <p:spPr>
           <a:xfrm>
             <a:off x="457200" y="273600"/>
-            <a:ext cx="8228880" cy="1144440"/>
+            <a:ext cx="8228520" cy="1144080"/>
           </a:xfrm>
           <a:prstGeom prst="rect">
             <a:avLst/>
@@ -855,7 +855,7 @@
         <p:spPr>
           <a:xfrm>
             <a:off x="457200" y="1604520"/>
-            <a:ext cx="4015440" cy="1896480"/>
+            <a:ext cx="1959120" cy="903960"/>
           </a:xfrm>
           <a:prstGeom prst="rect">
             <a:avLst/>
@@ -891,7 +891,7 @@
         <p:spPr>
           <a:xfrm>
             <a:off x="457200" y="1604520"/>
-            <a:ext cx="4015440" cy="1896480"/>
+            <a:ext cx="1959120" cy="903960"/>
           </a:xfrm>
           <a:prstGeom prst="rect">
             <a:avLst/>
@@ -926,8 +926,8 @@
         </p:blipFill>
         <p:spPr>
           <a:xfrm>
-            <a:off x="1276560" y="1604520"/>
-            <a:ext cx="2376720" cy="1896480"/>
+            <a:off x="870120" y="1604160"/>
+            <a:ext cx="1132920" cy="903960"/>
           </a:xfrm>
           <a:prstGeom prst="rect">
             <a:avLst/>
@@ -949,8 +949,8 @@
         </p:blipFill>
         <p:spPr>
           <a:xfrm>
-            <a:off x="1276560" y="1604520"/>
-            <a:ext cx="2376720" cy="1896480"/>
+            <a:off x="870120" y="1604160"/>
+            <a:ext cx="1132920" cy="903960"/>
           </a:xfrm>
           <a:prstGeom prst="rect">
             <a:avLst/>
@@ -1017,7 +1017,7 @@
         <p:spPr>
           <a:xfrm>
             <a:off x="457200" y="273600"/>
-            <a:ext cx="8228880" cy="1144440"/>
+            <a:ext cx="8228520" cy="1144080"/>
           </a:xfrm>
           <a:prstGeom prst="rect">
             <a:avLst/>
@@ -1053,8 +1053,8 @@
         </p:nvSpPr>
         <p:spPr>
           <a:xfrm>
-            <a:off x="457200" y="1604520"/>
-            <a:ext cx="4015440" cy="1896480"/>
+            <a:off x="457200" y="1600560"/>
+            <a:ext cx="1959120" cy="911880"/>
           </a:xfrm>
           <a:prstGeom prst="rect">
             <a:avLst/>
@@ -1113,7 +1113,7 @@
         <p:spPr>
           <a:xfrm>
             <a:off x="457200" y="273600"/>
-            <a:ext cx="8228880" cy="1144440"/>
+            <a:ext cx="8228520" cy="1144080"/>
           </a:xfrm>
           <a:prstGeom prst="rect">
             <a:avLst/>
@@ -1150,7 +1150,7 @@
         <p:spPr>
           <a:xfrm>
             <a:off x="457200" y="1604520"/>
-            <a:ext cx="4015440" cy="1896480"/>
+            <a:ext cx="1959120" cy="903960"/>
           </a:xfrm>
           <a:prstGeom prst="rect">
             <a:avLst/>
@@ -1208,7 +1208,7 @@
         <p:spPr>
           <a:xfrm>
             <a:off x="457200" y="273600"/>
-            <a:ext cx="8228880" cy="1144440"/>
+            <a:ext cx="8228520" cy="1144080"/>
           </a:xfrm>
           <a:prstGeom prst="rect">
             <a:avLst/>
@@ -1245,7 +1245,7 @@
         <p:spPr>
           <a:xfrm>
             <a:off x="457200" y="1604520"/>
-            <a:ext cx="1959480" cy="1896480"/>
+            <a:ext cx="955800" cy="903960"/>
           </a:xfrm>
           <a:prstGeom prst="rect">
             <a:avLst/>
@@ -1280,8 +1280,8 @@
         </p:nvSpPr>
         <p:spPr>
           <a:xfrm>
-            <a:off x="2514960" y="1604520"/>
-            <a:ext cx="1959480" cy="1896480"/>
+            <a:off x="1461240" y="1604520"/>
+            <a:ext cx="955800" cy="903960"/>
           </a:xfrm>
           <a:prstGeom prst="rect">
             <a:avLst/>
@@ -1339,7 +1339,7 @@
         <p:spPr>
           <a:xfrm>
             <a:off x="457200" y="273600"/>
-            <a:ext cx="8228880" cy="1144440"/>
+            <a:ext cx="8228520" cy="1144080"/>
           </a:xfrm>
           <a:prstGeom prst="rect">
             <a:avLst/>
@@ -1398,7 +1398,7 @@
         <p:spPr>
           <a:xfrm>
             <a:off x="457200" y="273600"/>
-            <a:ext cx="8228880" cy="5306400"/>
+            <a:ext cx="8228520" cy="5304600"/>
           </a:xfrm>
           <a:prstGeom prst="rect">
             <a:avLst/>
@@ -1457,7 +1457,7 @@
         <p:spPr>
           <a:xfrm>
             <a:off x="457200" y="273600"/>
-            <a:ext cx="8228880" cy="1144440"/>
+            <a:ext cx="8228520" cy="1144080"/>
           </a:xfrm>
           <a:prstGeom prst="rect">
             <a:avLst/>
@@ -1494,7 +1494,7 @@
         <p:spPr>
           <a:xfrm>
             <a:off x="457200" y="1604520"/>
-            <a:ext cx="1959480" cy="904320"/>
+            <a:ext cx="955800" cy="430920"/>
           </a:xfrm>
           <a:prstGeom prst="rect">
             <a:avLst/>
@@ -1529,8 +1529,8 @@
         </p:nvSpPr>
         <p:spPr>
           <a:xfrm>
-            <a:off x="457200" y="2595240"/>
-            <a:ext cx="1959480" cy="904320"/>
+            <a:off x="457200" y="2076840"/>
+            <a:ext cx="955800" cy="430920"/>
           </a:xfrm>
           <a:prstGeom prst="rect">
             <a:avLst/>
@@ -1565,8 +1565,8 @@
         </p:nvSpPr>
         <p:spPr>
           <a:xfrm>
-            <a:off x="2514960" y="1604520"/>
-            <a:ext cx="1959480" cy="1896480"/>
+            <a:off x="1461240" y="1604520"/>
+            <a:ext cx="955800" cy="903960"/>
           </a:xfrm>
           <a:prstGeom prst="rect">
             <a:avLst/>
@@ -1624,7 +1624,7 @@
         <p:spPr>
           <a:xfrm>
             <a:off x="457200" y="273600"/>
-            <a:ext cx="8228880" cy="1144440"/>
+            <a:ext cx="8228520" cy="1144080"/>
           </a:xfrm>
           <a:prstGeom prst="rect">
             <a:avLst/>
@@ -1660,8 +1660,8 @@
         </p:nvSpPr>
         <p:spPr>
           <a:xfrm>
-            <a:off x="457200" y="1604520"/>
-            <a:ext cx="4015440" cy="1896480"/>
+            <a:off x="457200" y="1600560"/>
+            <a:ext cx="1959120" cy="911880"/>
           </a:xfrm>
           <a:prstGeom prst="rect">
             <a:avLst/>
@@ -1720,7 +1720,7 @@
         <p:spPr>
           <a:xfrm>
             <a:off x="457200" y="273600"/>
-            <a:ext cx="8228880" cy="1144440"/>
+            <a:ext cx="8228520" cy="1144080"/>
           </a:xfrm>
           <a:prstGeom prst="rect">
             <a:avLst/>
@@ -1757,7 +1757,7 @@
         <p:spPr>
           <a:xfrm>
             <a:off x="457200" y="1604520"/>
-            <a:ext cx="1959480" cy="1896480"/>
+            <a:ext cx="955800" cy="903960"/>
           </a:xfrm>
           <a:prstGeom prst="rect">
             <a:avLst/>
@@ -1792,8 +1792,8 @@
         </p:nvSpPr>
         <p:spPr>
           <a:xfrm>
-            <a:off x="2514960" y="1604520"/>
-            <a:ext cx="1959480" cy="904320"/>
+            <a:off x="1461240" y="1604520"/>
+            <a:ext cx="955800" cy="430920"/>
           </a:xfrm>
           <a:prstGeom prst="rect">
             <a:avLst/>
@@ -1828,8 +1828,8 @@
         </p:nvSpPr>
         <p:spPr>
           <a:xfrm>
-            <a:off x="2514960" y="2595240"/>
-            <a:ext cx="1959480" cy="904320"/>
+            <a:off x="1461240" y="2076840"/>
+            <a:ext cx="955800" cy="430920"/>
           </a:xfrm>
           <a:prstGeom prst="rect">
             <a:avLst/>
@@ -1887,7 +1887,7 @@
         <p:spPr>
           <a:xfrm>
             <a:off x="457200" y="273600"/>
-            <a:ext cx="8228880" cy="1144440"/>
+            <a:ext cx="8228520" cy="1144080"/>
           </a:xfrm>
           <a:prstGeom prst="rect">
             <a:avLst/>
@@ -1924,7 +1924,7 @@
         <p:spPr>
           <a:xfrm>
             <a:off x="457200" y="1604520"/>
-            <a:ext cx="1959480" cy="904320"/>
+            <a:ext cx="955800" cy="430920"/>
           </a:xfrm>
           <a:prstGeom prst="rect">
             <a:avLst/>
@@ -1959,8 +1959,8 @@
         </p:nvSpPr>
         <p:spPr>
           <a:xfrm>
-            <a:off x="2514960" y="1604520"/>
-            <a:ext cx="1959480" cy="904320"/>
+            <a:off x="1461240" y="1604520"/>
+            <a:ext cx="955800" cy="430920"/>
           </a:xfrm>
           <a:prstGeom prst="rect">
             <a:avLst/>
@@ -1995,8 +1995,8 @@
         </p:nvSpPr>
         <p:spPr>
           <a:xfrm>
-            <a:off x="457200" y="2595240"/>
-            <a:ext cx="4015440" cy="904320"/>
+            <a:off x="457200" y="2076840"/>
+            <a:ext cx="1959120" cy="430920"/>
           </a:xfrm>
           <a:prstGeom prst="rect">
             <a:avLst/>
@@ -2054,7 +2054,7 @@
         <p:spPr>
           <a:xfrm>
             <a:off x="457200" y="273600"/>
-            <a:ext cx="8228880" cy="1144440"/>
+            <a:ext cx="8228520" cy="1144080"/>
           </a:xfrm>
           <a:prstGeom prst="rect">
             <a:avLst/>
@@ -2091,7 +2091,7 @@
         <p:spPr>
           <a:xfrm>
             <a:off x="457200" y="1604520"/>
-            <a:ext cx="4015440" cy="904320"/>
+            <a:ext cx="1959120" cy="430920"/>
           </a:xfrm>
           <a:prstGeom prst="rect">
             <a:avLst/>
@@ -2126,8 +2126,8 @@
         </p:nvSpPr>
         <p:spPr>
           <a:xfrm>
-            <a:off x="457200" y="2595240"/>
-            <a:ext cx="4015440" cy="904320"/>
+            <a:off x="457200" y="2076840"/>
+            <a:ext cx="1959120" cy="430920"/>
           </a:xfrm>
           <a:prstGeom prst="rect">
             <a:avLst/>
@@ -2185,7 +2185,7 @@
         <p:spPr>
           <a:xfrm>
             <a:off x="457200" y="273600"/>
-            <a:ext cx="8228880" cy="1144440"/>
+            <a:ext cx="8228520" cy="1144080"/>
           </a:xfrm>
           <a:prstGeom prst="rect">
             <a:avLst/>
@@ -2222,7 +2222,7 @@
         <p:spPr>
           <a:xfrm>
             <a:off x="457200" y="1604520"/>
-            <a:ext cx="1959480" cy="904320"/>
+            <a:ext cx="955800" cy="430920"/>
           </a:xfrm>
           <a:prstGeom prst="rect">
             <a:avLst/>
@@ -2257,8 +2257,8 @@
         </p:nvSpPr>
         <p:spPr>
           <a:xfrm>
-            <a:off x="2514960" y="1604520"/>
-            <a:ext cx="1959480" cy="904320"/>
+            <a:off x="1461240" y="1604520"/>
+            <a:ext cx="955800" cy="430920"/>
           </a:xfrm>
           <a:prstGeom prst="rect">
             <a:avLst/>
@@ -2293,8 +2293,8 @@
         </p:nvSpPr>
         <p:spPr>
           <a:xfrm>
-            <a:off x="2514960" y="2595240"/>
-            <a:ext cx="1959480" cy="904320"/>
+            <a:off x="1461240" y="2076840"/>
+            <a:ext cx="955800" cy="430920"/>
           </a:xfrm>
           <a:prstGeom prst="rect">
             <a:avLst/>
@@ -2329,8 +2329,8 @@
         </p:nvSpPr>
         <p:spPr>
           <a:xfrm>
-            <a:off x="457200" y="2595240"/>
-            <a:ext cx="1959480" cy="904320"/>
+            <a:off x="457200" y="2076840"/>
+            <a:ext cx="955800" cy="430920"/>
           </a:xfrm>
           <a:prstGeom prst="rect">
             <a:avLst/>
@@ -2388,7 +2388,7 @@
         <p:spPr>
           <a:xfrm>
             <a:off x="457200" y="273600"/>
-            <a:ext cx="8228880" cy="1144440"/>
+            <a:ext cx="8228520" cy="1144080"/>
           </a:xfrm>
           <a:prstGeom prst="rect">
             <a:avLst/>
@@ -2425,7 +2425,7 @@
         <p:spPr>
           <a:xfrm>
             <a:off x="457200" y="1604520"/>
-            <a:ext cx="4015440" cy="1896480"/>
+            <a:ext cx="1959120" cy="903960"/>
           </a:xfrm>
           <a:prstGeom prst="rect">
             <a:avLst/>
@@ -2461,7 +2461,7 @@
         <p:spPr>
           <a:xfrm>
             <a:off x="457200" y="1604520"/>
-            <a:ext cx="4015440" cy="1896480"/>
+            <a:ext cx="1959120" cy="903960"/>
           </a:xfrm>
           <a:prstGeom prst="rect">
             <a:avLst/>
@@ -2496,8 +2496,8 @@
         </p:blipFill>
         <p:spPr>
           <a:xfrm>
-            <a:off x="1276560" y="1604520"/>
-            <a:ext cx="2376720" cy="1896480"/>
+            <a:off x="870120" y="1604160"/>
+            <a:ext cx="1132920" cy="903960"/>
           </a:xfrm>
           <a:prstGeom prst="rect">
             <a:avLst/>
@@ -2519,8 +2519,8 @@
         </p:blipFill>
         <p:spPr>
           <a:xfrm>
-            <a:off x="1276560" y="1604520"/>
-            <a:ext cx="2376720" cy="1896480"/>
+            <a:off x="870120" y="1604160"/>
+            <a:ext cx="1132920" cy="903960"/>
           </a:xfrm>
           <a:prstGeom prst="rect">
             <a:avLst/>
@@ -2587,7 +2587,7 @@
         <p:spPr>
           <a:xfrm>
             <a:off x="457200" y="273600"/>
-            <a:ext cx="8228880" cy="1144440"/>
+            <a:ext cx="8228520" cy="1144080"/>
           </a:xfrm>
           <a:prstGeom prst="rect">
             <a:avLst/>
@@ -2623,8 +2623,8 @@
         </p:nvSpPr>
         <p:spPr>
           <a:xfrm>
-            <a:off x="457200" y="1604520"/>
-            <a:ext cx="4015440" cy="1896480"/>
+            <a:off x="457200" y="1600560"/>
+            <a:ext cx="1959120" cy="911880"/>
           </a:xfrm>
           <a:prstGeom prst="rect">
             <a:avLst/>
@@ -2683,7 +2683,7 @@
         <p:spPr>
           <a:xfrm>
             <a:off x="457200" y="273600"/>
-            <a:ext cx="8228880" cy="1144440"/>
+            <a:ext cx="8228520" cy="1144080"/>
           </a:xfrm>
           <a:prstGeom prst="rect">
             <a:avLst/>
@@ -2720,7 +2720,7 @@
         <p:spPr>
           <a:xfrm>
             <a:off x="457200" y="1604520"/>
-            <a:ext cx="4015440" cy="1896480"/>
+            <a:ext cx="1959120" cy="903960"/>
           </a:xfrm>
           <a:prstGeom prst="rect">
             <a:avLst/>
@@ -2778,7 +2778,7 @@
         <p:spPr>
           <a:xfrm>
             <a:off x="457200" y="273600"/>
-            <a:ext cx="8228880" cy="1144440"/>
+            <a:ext cx="8228520" cy="1144080"/>
           </a:xfrm>
           <a:prstGeom prst="rect">
             <a:avLst/>
@@ -2815,7 +2815,7 @@
         <p:spPr>
           <a:xfrm>
             <a:off x="457200" y="1604520"/>
-            <a:ext cx="1959480" cy="1896480"/>
+            <a:ext cx="955800" cy="903960"/>
           </a:xfrm>
           <a:prstGeom prst="rect">
             <a:avLst/>
@@ -2850,8 +2850,8 @@
         </p:nvSpPr>
         <p:spPr>
           <a:xfrm>
-            <a:off x="2514960" y="1604520"/>
-            <a:ext cx="1959480" cy="1896480"/>
+            <a:off x="1461240" y="1604520"/>
+            <a:ext cx="955800" cy="903960"/>
           </a:xfrm>
           <a:prstGeom prst="rect">
             <a:avLst/>
@@ -2909,7 +2909,7 @@
         <p:spPr>
           <a:xfrm>
             <a:off x="457200" y="273600"/>
-            <a:ext cx="8228880" cy="1144440"/>
+            <a:ext cx="8228520" cy="1144080"/>
           </a:xfrm>
           <a:prstGeom prst="rect">
             <a:avLst/>
@@ -2968,7 +2968,7 @@
         <p:spPr>
           <a:xfrm>
             <a:off x="457200" y="273600"/>
-            <a:ext cx="8228880" cy="1144440"/>
+            <a:ext cx="8228520" cy="1144080"/>
           </a:xfrm>
           <a:prstGeom prst="rect">
             <a:avLst/>
@@ -3005,7 +3005,7 @@
         <p:spPr>
           <a:xfrm>
             <a:off x="457200" y="1604520"/>
-            <a:ext cx="4015440" cy="1896480"/>
+            <a:ext cx="1959120" cy="903960"/>
           </a:xfrm>
           <a:prstGeom prst="rect">
             <a:avLst/>
@@ -3063,7 +3063,7 @@
         <p:spPr>
           <a:xfrm>
             <a:off x="457200" y="273600"/>
-            <a:ext cx="8228880" cy="5306400"/>
+            <a:ext cx="8228520" cy="5304600"/>
           </a:xfrm>
           <a:prstGeom prst="rect">
             <a:avLst/>
@@ -3122,7 +3122,7 @@
         <p:spPr>
           <a:xfrm>
             <a:off x="457200" y="273600"/>
-            <a:ext cx="8228880" cy="1144440"/>
+            <a:ext cx="8228520" cy="1144080"/>
           </a:xfrm>
           <a:prstGeom prst="rect">
             <a:avLst/>
@@ -3159,7 +3159,7 @@
         <p:spPr>
           <a:xfrm>
             <a:off x="457200" y="1604520"/>
-            <a:ext cx="1959480" cy="904320"/>
+            <a:ext cx="955800" cy="430920"/>
           </a:xfrm>
           <a:prstGeom prst="rect">
             <a:avLst/>
@@ -3194,8 +3194,8 @@
         </p:nvSpPr>
         <p:spPr>
           <a:xfrm>
-            <a:off x="457200" y="2595240"/>
-            <a:ext cx="1959480" cy="904320"/>
+            <a:off x="457200" y="2076840"/>
+            <a:ext cx="955800" cy="430920"/>
           </a:xfrm>
           <a:prstGeom prst="rect">
             <a:avLst/>
@@ -3230,8 +3230,8 @@
         </p:nvSpPr>
         <p:spPr>
           <a:xfrm>
-            <a:off x="2514960" y="1604520"/>
-            <a:ext cx="1959480" cy="1896480"/>
+            <a:off x="1461240" y="1604520"/>
+            <a:ext cx="955800" cy="903960"/>
           </a:xfrm>
           <a:prstGeom prst="rect">
             <a:avLst/>
@@ -3289,7 +3289,7 @@
         <p:spPr>
           <a:xfrm>
             <a:off x="457200" y="273600"/>
-            <a:ext cx="8228880" cy="1144440"/>
+            <a:ext cx="8228520" cy="1144080"/>
           </a:xfrm>
           <a:prstGeom prst="rect">
             <a:avLst/>
@@ -3326,7 +3326,7 @@
         <p:spPr>
           <a:xfrm>
             <a:off x="457200" y="1604520"/>
-            <a:ext cx="1959480" cy="1896480"/>
+            <a:ext cx="955800" cy="903960"/>
           </a:xfrm>
           <a:prstGeom prst="rect">
             <a:avLst/>
@@ -3361,8 +3361,8 @@
         </p:nvSpPr>
         <p:spPr>
           <a:xfrm>
-            <a:off x="2514960" y="1604520"/>
-            <a:ext cx="1959480" cy="904320"/>
+            <a:off x="1461240" y="1604520"/>
+            <a:ext cx="955800" cy="430920"/>
           </a:xfrm>
           <a:prstGeom prst="rect">
             <a:avLst/>
@@ -3397,8 +3397,8 @@
         </p:nvSpPr>
         <p:spPr>
           <a:xfrm>
-            <a:off x="2514960" y="2595240"/>
-            <a:ext cx="1959480" cy="904320"/>
+            <a:off x="1461240" y="2076840"/>
+            <a:ext cx="955800" cy="430920"/>
           </a:xfrm>
           <a:prstGeom prst="rect">
             <a:avLst/>
@@ -3456,7 +3456,7 @@
         <p:spPr>
           <a:xfrm>
             <a:off x="457200" y="273600"/>
-            <a:ext cx="8228880" cy="1144440"/>
+            <a:ext cx="8228520" cy="1144080"/>
           </a:xfrm>
           <a:prstGeom prst="rect">
             <a:avLst/>
@@ -3493,7 +3493,7 @@
         <p:spPr>
           <a:xfrm>
             <a:off x="457200" y="1604520"/>
-            <a:ext cx="1959480" cy="904320"/>
+            <a:ext cx="955800" cy="430920"/>
           </a:xfrm>
           <a:prstGeom prst="rect">
             <a:avLst/>
@@ -3528,8 +3528,8 @@
         </p:nvSpPr>
         <p:spPr>
           <a:xfrm>
-            <a:off x="2514960" y="1604520"/>
-            <a:ext cx="1959480" cy="904320"/>
+            <a:off x="1461240" y="1604520"/>
+            <a:ext cx="955800" cy="430920"/>
           </a:xfrm>
           <a:prstGeom prst="rect">
             <a:avLst/>
@@ -3564,8 +3564,8 @@
         </p:nvSpPr>
         <p:spPr>
           <a:xfrm>
-            <a:off x="457200" y="2595240"/>
-            <a:ext cx="4015440" cy="904320"/>
+            <a:off x="457200" y="2076840"/>
+            <a:ext cx="1959120" cy="430920"/>
           </a:xfrm>
           <a:prstGeom prst="rect">
             <a:avLst/>
@@ -3623,7 +3623,7 @@
         <p:spPr>
           <a:xfrm>
             <a:off x="457200" y="273600"/>
-            <a:ext cx="8228880" cy="1144440"/>
+            <a:ext cx="8228520" cy="1144080"/>
           </a:xfrm>
           <a:prstGeom prst="rect">
             <a:avLst/>
@@ -3660,7 +3660,7 @@
         <p:spPr>
           <a:xfrm>
             <a:off x="457200" y="1604520"/>
-            <a:ext cx="4015440" cy="904320"/>
+            <a:ext cx="1959120" cy="430920"/>
           </a:xfrm>
           <a:prstGeom prst="rect">
             <a:avLst/>
@@ -3695,8 +3695,8 @@
         </p:nvSpPr>
         <p:spPr>
           <a:xfrm>
-            <a:off x="457200" y="2595240"/>
-            <a:ext cx="4015440" cy="904320"/>
+            <a:off x="457200" y="2076840"/>
+            <a:ext cx="1959120" cy="430920"/>
           </a:xfrm>
           <a:prstGeom prst="rect">
             <a:avLst/>
@@ -3754,7 +3754,7 @@
         <p:spPr>
           <a:xfrm>
             <a:off x="457200" y="273600"/>
-            <a:ext cx="8228880" cy="1144440"/>
+            <a:ext cx="8228520" cy="1144080"/>
           </a:xfrm>
           <a:prstGeom prst="rect">
             <a:avLst/>
@@ -3791,7 +3791,7 @@
         <p:spPr>
           <a:xfrm>
             <a:off x="457200" y="1604520"/>
-            <a:ext cx="1959480" cy="904320"/>
+            <a:ext cx="955800" cy="430920"/>
           </a:xfrm>
           <a:prstGeom prst="rect">
             <a:avLst/>
@@ -3826,8 +3826,8 @@
         </p:nvSpPr>
         <p:spPr>
           <a:xfrm>
-            <a:off x="2514960" y="1604520"/>
-            <a:ext cx="1959480" cy="904320"/>
+            <a:off x="1461240" y="1604520"/>
+            <a:ext cx="955800" cy="430920"/>
           </a:xfrm>
           <a:prstGeom prst="rect">
             <a:avLst/>
@@ -3862,8 +3862,8 @@
         </p:nvSpPr>
         <p:spPr>
           <a:xfrm>
-            <a:off x="2514960" y="2595240"/>
-            <a:ext cx="1959480" cy="904320"/>
+            <a:off x="1461240" y="2076840"/>
+            <a:ext cx="955800" cy="430920"/>
           </a:xfrm>
           <a:prstGeom prst="rect">
             <a:avLst/>
@@ -3898,8 +3898,8 @@
         </p:nvSpPr>
         <p:spPr>
           <a:xfrm>
-            <a:off x="457200" y="2595240"/>
-            <a:ext cx="1959480" cy="904320"/>
+            <a:off x="457200" y="2076840"/>
+            <a:ext cx="955800" cy="430920"/>
           </a:xfrm>
           <a:prstGeom prst="rect">
             <a:avLst/>
@@ -3957,7 +3957,7 @@
         <p:spPr>
           <a:xfrm>
             <a:off x="457200" y="273600"/>
-            <a:ext cx="8228880" cy="1144440"/>
+            <a:ext cx="8228520" cy="1144080"/>
           </a:xfrm>
           <a:prstGeom prst="rect">
             <a:avLst/>
@@ -3994,7 +3994,7 @@
         <p:spPr>
           <a:xfrm>
             <a:off x="457200" y="1604520"/>
-            <a:ext cx="4015440" cy="1896480"/>
+            <a:ext cx="1959120" cy="903960"/>
           </a:xfrm>
           <a:prstGeom prst="rect">
             <a:avLst/>
@@ -4030,7 +4030,7 @@
         <p:spPr>
           <a:xfrm>
             <a:off x="457200" y="1604520"/>
-            <a:ext cx="4015440" cy="1896480"/>
+            <a:ext cx="1959120" cy="903960"/>
           </a:xfrm>
           <a:prstGeom prst="rect">
             <a:avLst/>
@@ -4065,8 +4065,8 @@
         </p:blipFill>
         <p:spPr>
           <a:xfrm>
-            <a:off x="1276560" y="1604520"/>
-            <a:ext cx="2376720" cy="1896480"/>
+            <a:off x="870120" y="1604160"/>
+            <a:ext cx="1132920" cy="903960"/>
           </a:xfrm>
           <a:prstGeom prst="rect">
             <a:avLst/>
@@ -4088,8 +4088,8 @@
         </p:blipFill>
         <p:spPr>
           <a:xfrm>
-            <a:off x="1276560" y="1604520"/>
-            <a:ext cx="2376720" cy="1896480"/>
+            <a:off x="870120" y="1604160"/>
+            <a:ext cx="1132920" cy="903960"/>
           </a:xfrm>
           <a:prstGeom prst="rect">
             <a:avLst/>
@@ -4134,7 +4134,7 @@
         <p:spPr>
           <a:xfrm>
             <a:off x="457200" y="273600"/>
-            <a:ext cx="8228880" cy="1144440"/>
+            <a:ext cx="8228520" cy="1144080"/>
           </a:xfrm>
           <a:prstGeom prst="rect">
             <a:avLst/>
@@ -4171,7 +4171,7 @@
         <p:spPr>
           <a:xfrm>
             <a:off x="457200" y="1604520"/>
-            <a:ext cx="1959480" cy="1896480"/>
+            <a:ext cx="955800" cy="903960"/>
           </a:xfrm>
           <a:prstGeom prst="rect">
             <a:avLst/>
@@ -4206,8 +4206,8 @@
         </p:nvSpPr>
         <p:spPr>
           <a:xfrm>
-            <a:off x="2514960" y="1604520"/>
-            <a:ext cx="1959480" cy="1896480"/>
+            <a:off x="1461240" y="1604520"/>
+            <a:ext cx="955800" cy="903960"/>
           </a:xfrm>
           <a:prstGeom prst="rect">
             <a:avLst/>
@@ -4265,7 +4265,7 @@
         <p:spPr>
           <a:xfrm>
             <a:off x="457200" y="273600"/>
-            <a:ext cx="8228880" cy="1144440"/>
+            <a:ext cx="8228520" cy="1144080"/>
           </a:xfrm>
           <a:prstGeom prst="rect">
             <a:avLst/>
@@ -4324,7 +4324,7 @@
         <p:spPr>
           <a:xfrm>
             <a:off x="457200" y="273600"/>
-            <a:ext cx="8228880" cy="5306400"/>
+            <a:ext cx="8228520" cy="5304600"/>
           </a:xfrm>
           <a:prstGeom prst="rect">
             <a:avLst/>
@@ -4383,7 +4383,7 @@
         <p:spPr>
           <a:xfrm>
             <a:off x="457200" y="273600"/>
-            <a:ext cx="8228880" cy="1144440"/>
+            <a:ext cx="8228520" cy="1144080"/>
           </a:xfrm>
           <a:prstGeom prst="rect">
             <a:avLst/>
@@ -4420,7 +4420,7 @@
         <p:spPr>
           <a:xfrm>
             <a:off x="457200" y="1604520"/>
-            <a:ext cx="1959480" cy="904320"/>
+            <a:ext cx="955800" cy="430920"/>
           </a:xfrm>
           <a:prstGeom prst="rect">
             <a:avLst/>
@@ -4455,8 +4455,8 @@
         </p:nvSpPr>
         <p:spPr>
           <a:xfrm>
-            <a:off x="457200" y="2595240"/>
-            <a:ext cx="1959480" cy="904320"/>
+            <a:off x="457200" y="2076840"/>
+            <a:ext cx="955800" cy="430920"/>
           </a:xfrm>
           <a:prstGeom prst="rect">
             <a:avLst/>
@@ -4491,8 +4491,8 @@
         </p:nvSpPr>
         <p:spPr>
           <a:xfrm>
-            <a:off x="2514960" y="1604520"/>
-            <a:ext cx="1959480" cy="1896480"/>
+            <a:off x="1461240" y="1604520"/>
+            <a:ext cx="955800" cy="903960"/>
           </a:xfrm>
           <a:prstGeom prst="rect">
             <a:avLst/>
@@ -4550,7 +4550,7 @@
         <p:spPr>
           <a:xfrm>
             <a:off x="457200" y="273600"/>
-            <a:ext cx="8228880" cy="1144440"/>
+            <a:ext cx="8228520" cy="1144080"/>
           </a:xfrm>
           <a:prstGeom prst="rect">
             <a:avLst/>
@@ -4587,7 +4587,7 @@
         <p:spPr>
           <a:xfrm>
             <a:off x="457200" y="1604520"/>
-            <a:ext cx="1959480" cy="1896480"/>
+            <a:ext cx="955800" cy="903960"/>
           </a:xfrm>
           <a:prstGeom prst="rect">
             <a:avLst/>
@@ -4622,8 +4622,8 @@
         </p:nvSpPr>
         <p:spPr>
           <a:xfrm>
-            <a:off x="2514960" y="1604520"/>
-            <a:ext cx="1959480" cy="904320"/>
+            <a:off x="1461240" y="1604520"/>
+            <a:ext cx="955800" cy="430920"/>
           </a:xfrm>
           <a:prstGeom prst="rect">
             <a:avLst/>
@@ -4658,8 +4658,8 @@
         </p:nvSpPr>
         <p:spPr>
           <a:xfrm>
-            <a:off x="2514960" y="2595240"/>
-            <a:ext cx="1959480" cy="904320"/>
+            <a:off x="1461240" y="2076840"/>
+            <a:ext cx="955800" cy="430920"/>
           </a:xfrm>
           <a:prstGeom prst="rect">
             <a:avLst/>
@@ -4717,7 +4717,7 @@
         <p:spPr>
           <a:xfrm>
             <a:off x="457200" y="273600"/>
-            <a:ext cx="8228880" cy="1144440"/>
+            <a:ext cx="8228520" cy="1144080"/>
           </a:xfrm>
           <a:prstGeom prst="rect">
             <a:avLst/>
@@ -4754,7 +4754,7 @@
         <p:spPr>
           <a:xfrm>
             <a:off x="457200" y="1604520"/>
-            <a:ext cx="1959480" cy="904320"/>
+            <a:ext cx="955800" cy="430920"/>
           </a:xfrm>
           <a:prstGeom prst="rect">
             <a:avLst/>
@@ -4789,8 +4789,8 @@
         </p:nvSpPr>
         <p:spPr>
           <a:xfrm>
-            <a:off x="2514960" y="1604520"/>
-            <a:ext cx="1959480" cy="904320"/>
+            <a:off x="1461240" y="1604520"/>
+            <a:ext cx="955800" cy="430920"/>
           </a:xfrm>
           <a:prstGeom prst="rect">
             <a:avLst/>
@@ -4825,8 +4825,8 @@
         </p:nvSpPr>
         <p:spPr>
           <a:xfrm>
-            <a:off x="457200" y="2595240"/>
-            <a:ext cx="4015440" cy="904320"/>
+            <a:off x="457200" y="2076840"/>
+            <a:ext cx="1959120" cy="430920"/>
           </a:xfrm>
           <a:prstGeom prst="rect">
             <a:avLst/>
@@ -4894,7 +4894,7 @@
         <p:spPr>
           <a:xfrm>
             <a:off x="-6480" y="0"/>
-            <a:ext cx="9155160" cy="6856560"/>
+            <a:ext cx="9154800" cy="6856200"/>
           </a:xfrm>
           <a:prstGeom prst="rect">
             <a:avLst/>
@@ -4917,7 +4917,7 @@
         <p:spPr>
           <a:xfrm>
             <a:off x="-6480" y="0"/>
-            <a:ext cx="9155160" cy="6856560"/>
+            <a:ext cx="9154800" cy="6856200"/>
           </a:xfrm>
           <a:prstGeom prst="rect">
             <a:avLst/>
@@ -4940,7 +4940,7 @@
         <p:spPr>
           <a:xfrm>
             <a:off x="-12600" y="0"/>
-            <a:ext cx="9155160" cy="6856560"/>
+            <a:ext cx="9154800" cy="6856200"/>
           </a:xfrm>
           <a:prstGeom prst="rect">
             <a:avLst/>
@@ -5763,7 +5763,7 @@
         <p:spPr>
           <a:xfrm>
             <a:off x="457200" y="273600"/>
-            <a:ext cx="8228880" cy="1144440"/>
+            <a:ext cx="8228520" cy="1144080"/>
           </a:xfrm>
           <a:prstGeom prst="rect">
             <a:avLst/>
@@ -5800,7 +5800,7 @@
         <p:spPr>
           <a:xfrm>
             <a:off x="457200" y="1604520"/>
-            <a:ext cx="4015440" cy="1896480"/>
+            <a:ext cx="1959120" cy="903960"/>
           </a:xfrm>
           <a:prstGeom prst="rect">
             <a:avLst/>
@@ -6067,8 +6067,8 @@
         </p:nvSpPr>
         <p:spPr>
           <a:xfrm>
-            <a:off x="4674240" y="1604520"/>
-            <a:ext cx="4015440" cy="1896480"/>
+            <a:off x="2514960" y="1604520"/>
+            <a:ext cx="1959120" cy="903960"/>
           </a:xfrm>
           <a:prstGeom prst="rect">
             <a:avLst/>
@@ -6335,8 +6335,8 @@
         </p:nvSpPr>
         <p:spPr>
           <a:xfrm>
-            <a:off x="457200" y="3682080"/>
-            <a:ext cx="8228880" cy="1896480"/>
+            <a:off x="457200" y="2595240"/>
+            <a:ext cx="4015080" cy="903960"/>
           </a:xfrm>
           <a:prstGeom prst="rect">
             <a:avLst/>
@@ -6637,7 +6637,7 @@
         <p:spPr>
           <a:xfrm>
             <a:off x="1391400" y="864360"/>
-            <a:ext cx="6359760" cy="455040"/>
+            <a:ext cx="6359400" cy="454680"/>
           </a:xfrm>
           <a:prstGeom prst="rect">
             <a:avLst/>
@@ -6699,7 +6699,7 @@
         <p:spPr>
           <a:xfrm>
             <a:off x="590760" y="3990600"/>
-            <a:ext cx="3144960" cy="912240"/>
+            <a:ext cx="3144600" cy="911880"/>
           </a:xfrm>
           <a:prstGeom prst="rect">
             <a:avLst/>
@@ -6812,7 +6812,7 @@
         <p:spPr>
           <a:xfrm>
             <a:off x="2794680" y="2365920"/>
-            <a:ext cx="3553200" cy="394200"/>
+            <a:ext cx="3552840" cy="393840"/>
           </a:xfrm>
           <a:prstGeom prst="rect">
             <a:avLst/>
@@ -6874,7 +6874,7 @@
         <p:spPr>
           <a:xfrm>
             <a:off x="590760" y="4908600"/>
-            <a:ext cx="6139800" cy="1543680"/>
+            <a:ext cx="6139440" cy="1543320"/>
           </a:xfrm>
           <a:prstGeom prst="rect">
             <a:avLst/>
@@ -7018,7 +7018,7 @@
         <p:spPr>
           <a:xfrm>
             <a:off x="2319120" y="501840"/>
-            <a:ext cx="4479120" cy="576720"/>
+            <a:ext cx="4478760" cy="576360"/>
           </a:xfrm>
           <a:prstGeom prst="rect">
             <a:avLst/>
@@ -7080,7 +7080,7 @@
         <p:spPr>
           <a:xfrm>
             <a:off x="2082240" y="1086840"/>
-            <a:ext cx="44280" cy="5789880"/>
+            <a:ext cx="43920" cy="5789520"/>
           </a:xfrm>
           <a:prstGeom prst="rect">
             <a:avLst/>
@@ -7113,7 +7113,7 @@
         <p:spPr>
           <a:xfrm>
             <a:off x="6553080" y="6356520"/>
-            <a:ext cx="2132280" cy="363600"/>
+            <a:ext cx="2131920" cy="363240"/>
           </a:xfrm>
           <a:prstGeom prst="rect">
             <a:avLst/>
@@ -7137,7 +7137,7 @@
                 <a:spcPct val="100000"/>
               </a:lnSpc>
             </a:pPr>
-            <a:fld id="{4686E8D9-5AC6-466F-B4DD-75073F0FA6EE}" type="slidenum">
+            <a:fld id="{DB604AB8-9246-4213-A5A6-48A48A3A4B55}" type="slidenum">
               <a:rPr b="0" lang="en-US" sz="900" spc="-1" strike="noStrike">
                 <a:solidFill>
                   <a:srgbClr val="898c9d"/>
@@ -7150,7 +7150,7 @@
                 <a:latin typeface="Arial"/>
                 <a:ea typeface="DejaVu Sans"/>
               </a:rPr>
-              <a:t>1</a:t>
+              <a:t>&lt;number&gt;</a:t>
             </a:fld>
             <a:endParaRPr b="0" lang="en-US" sz="1800" spc="-1" strike="noStrike">
               <a:solidFill>
@@ -7175,7 +7175,7 @@
         <p:spPr>
           <a:xfrm>
             <a:off x="0" y="1673640"/>
-            <a:ext cx="2073960" cy="2859840"/>
+            <a:ext cx="2073600" cy="2859480"/>
           </a:xfrm>
           <a:prstGeom prst="rect">
             <a:avLst/>
@@ -7441,7 +7441,7 @@
         <p:spPr>
           <a:xfrm>
             <a:off x="2319120" y="1541160"/>
-            <a:ext cx="6266880" cy="927000"/>
+            <a:ext cx="6266520" cy="926640"/>
           </a:xfrm>
           <a:prstGeom prst="rect">
             <a:avLst/>
@@ -7503,7 +7503,7 @@
         <p:spPr>
           <a:xfrm>
             <a:off x="-6840" y="3474720"/>
-            <a:ext cx="2080800" cy="44280"/>
+            <a:ext cx="2080440" cy="43920"/>
           </a:xfrm>
           <a:prstGeom prst="rect">
             <a:avLst/>
@@ -7541,7 +7541,7 @@
         <p:spPr>
           <a:xfrm>
             <a:off x="2560320" y="2271960"/>
-            <a:ext cx="5760360" cy="3579840"/>
+            <a:ext cx="5760000" cy="3579480"/>
           </a:xfrm>
           <a:prstGeom prst="rect">
             <a:avLst/>
@@ -7609,7 +7609,7 @@
         <p:spPr>
           <a:xfrm>
             <a:off x="2319120" y="501840"/>
-            <a:ext cx="4479120" cy="576720"/>
+            <a:ext cx="4478760" cy="576360"/>
           </a:xfrm>
           <a:prstGeom prst="rect">
             <a:avLst/>
@@ -7671,7 +7671,7 @@
         <p:spPr>
           <a:xfrm>
             <a:off x="2082240" y="1086840"/>
-            <a:ext cx="44280" cy="5789880"/>
+            <a:ext cx="43920" cy="5789520"/>
           </a:xfrm>
           <a:prstGeom prst="rect">
             <a:avLst/>
@@ -7704,7 +7704,7 @@
         <p:spPr>
           <a:xfrm>
             <a:off x="6553080" y="6356520"/>
-            <a:ext cx="2132280" cy="363600"/>
+            <a:ext cx="2131920" cy="363240"/>
           </a:xfrm>
           <a:prstGeom prst="rect">
             <a:avLst/>
@@ -7728,7 +7728,7 @@
                 <a:spcPct val="100000"/>
               </a:lnSpc>
             </a:pPr>
-            <a:fld id="{15147F86-32A0-45E9-A315-97A1A1A2C018}" type="slidenum">
+            <a:fld id="{6570F362-6911-499D-A19A-7DD9E154040D}" type="slidenum">
               <a:rPr b="0" lang="en-US" sz="900" spc="-1" strike="noStrike">
                 <a:solidFill>
                   <a:srgbClr val="898c9d"/>
@@ -7741,7 +7741,7 @@
                 <a:latin typeface="Arial"/>
                 <a:ea typeface="DejaVu Sans"/>
               </a:rPr>
-              <a:t>1</a:t>
+              <a:t>&lt;number&gt;</a:t>
             </a:fld>
             <a:endParaRPr b="0" lang="en-US" sz="1800" spc="-1" strike="noStrike">
               <a:solidFill>
@@ -7766,7 +7766,7 @@
         <p:spPr>
           <a:xfrm>
             <a:off x="0" y="1673640"/>
-            <a:ext cx="2073960" cy="2859840"/>
+            <a:ext cx="2073600" cy="2859480"/>
           </a:xfrm>
           <a:prstGeom prst="rect">
             <a:avLst/>
@@ -8032,7 +8032,7 @@
         <p:spPr>
           <a:xfrm>
             <a:off x="2319120" y="1541160"/>
-            <a:ext cx="6266880" cy="927000"/>
+            <a:ext cx="6266520" cy="926640"/>
           </a:xfrm>
           <a:prstGeom prst="rect">
             <a:avLst/>
@@ -8098,7 +8098,7 @@
         <p:spPr>
           <a:xfrm>
             <a:off x="3383280" y="2194560"/>
-            <a:ext cx="4500720" cy="3675600"/>
+            <a:ext cx="4500360" cy="3675240"/>
           </a:xfrm>
           <a:prstGeom prst="rect">
             <a:avLst/>
@@ -8117,7 +8117,7 @@
         <p:spPr>
           <a:xfrm>
             <a:off x="-6840" y="3474720"/>
-            <a:ext cx="2080800" cy="44280"/>
+            <a:ext cx="2080440" cy="43920"/>
           </a:xfrm>
           <a:prstGeom prst="rect">
             <a:avLst/>
@@ -8199,7 +8199,7 @@
         <p:spPr>
           <a:xfrm>
             <a:off x="2319120" y="501840"/>
-            <a:ext cx="4479120" cy="576720"/>
+            <a:ext cx="4478760" cy="576360"/>
           </a:xfrm>
           <a:prstGeom prst="rect">
             <a:avLst/>
@@ -8261,7 +8261,7 @@
         <p:spPr>
           <a:xfrm>
             <a:off x="2082240" y="1086840"/>
-            <a:ext cx="44280" cy="5789880"/>
+            <a:ext cx="43920" cy="5789520"/>
           </a:xfrm>
           <a:prstGeom prst="rect">
             <a:avLst/>
@@ -8294,7 +8294,7 @@
         <p:spPr>
           <a:xfrm>
             <a:off x="6553080" y="6356520"/>
-            <a:ext cx="2132280" cy="363600"/>
+            <a:ext cx="2131920" cy="363240"/>
           </a:xfrm>
           <a:prstGeom prst="rect">
             <a:avLst/>
@@ -8318,7 +8318,7 @@
                 <a:spcPct val="100000"/>
               </a:lnSpc>
             </a:pPr>
-            <a:fld id="{AD9CC244-5501-4ABC-A919-3FDA0265AF3D}" type="slidenum">
+            <a:fld id="{EDCBC840-00DB-4B39-87A6-BB004E427542}" type="slidenum">
               <a:rPr b="0" lang="en-US" sz="900" spc="-1" strike="noStrike">
                 <a:solidFill>
                   <a:srgbClr val="898c9d"/>
@@ -8331,7 +8331,7 @@
                 <a:latin typeface="Arial"/>
                 <a:ea typeface="DejaVu Sans"/>
               </a:rPr>
-              <a:t>1</a:t>
+              <a:t>&lt;number&gt;</a:t>
             </a:fld>
             <a:endParaRPr b="0" lang="en-US" sz="1800" spc="-1" strike="noStrike">
               <a:solidFill>
@@ -8356,7 +8356,7 @@
         <p:spPr>
           <a:xfrm>
             <a:off x="0" y="1673640"/>
-            <a:ext cx="2073960" cy="2859840"/>
+            <a:ext cx="2073600" cy="2859480"/>
           </a:xfrm>
           <a:prstGeom prst="rect">
             <a:avLst/>
@@ -8622,7 +8622,7 @@
         <p:spPr>
           <a:xfrm>
             <a:off x="2319120" y="1541160"/>
-            <a:ext cx="6266880" cy="927000"/>
+            <a:ext cx="6266520" cy="926640"/>
           </a:xfrm>
           <a:prstGeom prst="rect">
             <a:avLst/>
@@ -8659,67 +8659,7 @@
                 <a:latin typeface="Arial"/>
                 <a:ea typeface="DejaVu Sans"/>
               </a:rPr>
-              <a:t>De maneira similar a outras aplicações distribuídas como o </a:t>
-            </a:r>
-            <a:r>
-              <a:rPr b="0" i="1" lang="en-US" sz="2200" spc="-1" strike="noStrike">
-                <a:solidFill>
-                  <a:srgbClr val="002060"/>
-                </a:solidFill>
-                <a:uFill>
-                  <a:solidFill>
-                    <a:srgbClr val="ffffff"/>
-                  </a:solidFill>
-                </a:uFill>
-                <a:latin typeface="Arial"/>
-                <a:ea typeface="DejaVu Sans"/>
-              </a:rPr>
-              <a:t>Bitcoin</a:t>
-            </a:r>
-            <a:r>
-              <a:rPr b="0" lang="en-US" sz="2200" spc="-1" strike="noStrike">
-                <a:solidFill>
-                  <a:srgbClr val="002060"/>
-                </a:solidFill>
-                <a:uFill>
-                  <a:solidFill>
-                    <a:srgbClr val="ffffff"/>
-                  </a:solidFill>
-                </a:uFill>
-                <a:latin typeface="Arial"/>
-                <a:ea typeface="DejaVu Sans"/>
-              </a:rPr>
-              <a:t> (</a:t>
-            </a:r>
-            <a:r>
-              <a:rPr b="0" lang="en-US" sz="2200" spc="-1" strike="noStrike">
-                <a:solidFill>
-                  <a:srgbClr val="002060"/>
-                </a:solidFill>
-                <a:uFill>
-                  <a:solidFill>
-                    <a:srgbClr val="ffffff"/>
-                  </a:solidFill>
-                </a:uFill>
-                <a:latin typeface="Arial"/>
-                <a:ea typeface="Arial"/>
-              </a:rPr>
-              <a:t>CHOHAN, 2017)</a:t>
-            </a:r>
-            <a:r>
-              <a:rPr b="0" lang="en-US" sz="2200" spc="-1" strike="noStrike">
-                <a:solidFill>
-                  <a:srgbClr val="002060"/>
-                </a:solidFill>
-                <a:uFill>
-                  <a:solidFill>
-                    <a:srgbClr val="ffffff"/>
-                  </a:solidFill>
-                </a:uFill>
-                <a:latin typeface="Arial"/>
-                <a:ea typeface="DejaVu Sans"/>
-              </a:rPr>
-              <a:t>, a infraestutura não possui uma autoridade central com poder de emitir ou realizar transferências de VoltTokens de forma indetectável ou fora das regras de negócio definidas no contrato inteligente.</a:t>
+              <a:t>A infraestutura não possui uma autoridade central com poder de emitir ou realizar transferências de VoltTokens de forma indetectável ou fora das regras de negócio definidas no contrato inteligente.</a:t>
             </a:r>
             <a:endParaRPr b="0" lang="en-US" sz="1800" spc="-1" strike="noStrike">
               <a:solidFill>
@@ -8744,7 +8684,7 @@
         <p:spPr>
           <a:xfrm>
             <a:off x="-6840" y="3474720"/>
-            <a:ext cx="2080800" cy="44280"/>
+            <a:ext cx="2080440" cy="43920"/>
           </a:xfrm>
           <a:prstGeom prst="rect">
             <a:avLst/>
@@ -8780,8 +8720,8 @@
         </p:blipFill>
         <p:spPr>
           <a:xfrm>
-            <a:off x="2377440" y="4732200"/>
-            <a:ext cx="6133320" cy="1485360"/>
+            <a:off x="2377440" y="4297680"/>
+            <a:ext cx="6132960" cy="1485000"/>
           </a:xfrm>
           <a:prstGeom prst="rect">
             <a:avLst/>
@@ -8849,7 +8789,7 @@
         <p:spPr>
           <a:xfrm>
             <a:off x="2319120" y="501840"/>
-            <a:ext cx="4479120" cy="576720"/>
+            <a:ext cx="4478760" cy="576360"/>
           </a:xfrm>
           <a:prstGeom prst="rect">
             <a:avLst/>
@@ -8911,7 +8851,7 @@
         <p:spPr>
           <a:xfrm>
             <a:off x="2082240" y="1086840"/>
-            <a:ext cx="44280" cy="5789880"/>
+            <a:ext cx="43920" cy="5789520"/>
           </a:xfrm>
           <a:prstGeom prst="rect">
             <a:avLst/>
@@ -8944,7 +8884,7 @@
         <p:spPr>
           <a:xfrm>
             <a:off x="6553080" y="6356520"/>
-            <a:ext cx="2132280" cy="363600"/>
+            <a:ext cx="2131920" cy="363240"/>
           </a:xfrm>
           <a:prstGeom prst="rect">
             <a:avLst/>
@@ -8968,7 +8908,7 @@
                 <a:spcPct val="100000"/>
               </a:lnSpc>
             </a:pPr>
-            <a:fld id="{567E8575-5F88-471D-81CB-DEDB0CA6A2B9}" type="slidenum">
+            <a:fld id="{C4830F7A-C844-4427-BDB2-7531256ED706}" type="slidenum">
               <a:rPr b="0" lang="en-US" sz="900" spc="-1" strike="noStrike">
                 <a:solidFill>
                   <a:srgbClr val="898c9d"/>
@@ -8981,7 +8921,7 @@
                 <a:latin typeface="Arial"/>
                 <a:ea typeface="DejaVu Sans"/>
               </a:rPr>
-              <a:t>1</a:t>
+              <a:t>&lt;number&gt;</a:t>
             </a:fld>
             <a:endParaRPr b="0" lang="en-US" sz="1800" spc="-1" strike="noStrike">
               <a:solidFill>
@@ -9006,7 +8946,7 @@
         <p:spPr>
           <a:xfrm>
             <a:off x="0" y="1673640"/>
-            <a:ext cx="2073960" cy="2859840"/>
+            <a:ext cx="2073600" cy="2859480"/>
           </a:xfrm>
           <a:prstGeom prst="rect">
             <a:avLst/>
@@ -9272,7 +9212,7 @@
         <p:spPr>
           <a:xfrm>
             <a:off x="2319120" y="1541160"/>
-            <a:ext cx="4172400" cy="927000"/>
+            <a:ext cx="4172040" cy="926640"/>
           </a:xfrm>
           <a:prstGeom prst="rect">
             <a:avLst/>
@@ -9338,7 +9278,7 @@
         <p:spPr>
           <a:xfrm>
             <a:off x="6675120" y="1571400"/>
-            <a:ext cx="1702800" cy="4777200"/>
+            <a:ext cx="1702440" cy="4776840"/>
           </a:xfrm>
           <a:prstGeom prst="rect">
             <a:avLst/>
@@ -9406,7 +9346,7 @@
         <p:spPr>
           <a:xfrm>
             <a:off x="3006720" y="536040"/>
-            <a:ext cx="3444120" cy="576720"/>
+            <a:ext cx="3443760" cy="576360"/>
           </a:xfrm>
           <a:prstGeom prst="rect">
             <a:avLst/>
@@ -9468,7 +9408,7 @@
         <p:spPr>
           <a:xfrm>
             <a:off x="2082240" y="1086840"/>
-            <a:ext cx="44280" cy="5789880"/>
+            <a:ext cx="43920" cy="5789520"/>
           </a:xfrm>
           <a:prstGeom prst="rect">
             <a:avLst/>
@@ -9501,7 +9441,7 @@
         <p:spPr>
           <a:xfrm>
             <a:off x="0" y="4252680"/>
-            <a:ext cx="2080800" cy="44280"/>
+            <a:ext cx="2080440" cy="43920"/>
           </a:xfrm>
           <a:prstGeom prst="rect">
             <a:avLst/>
@@ -9534,7 +9474,7 @@
         <p:spPr>
           <a:xfrm>
             <a:off x="6553080" y="6356520"/>
-            <a:ext cx="2132280" cy="363600"/>
+            <a:ext cx="2131920" cy="363240"/>
           </a:xfrm>
           <a:prstGeom prst="rect">
             <a:avLst/>
@@ -9558,7 +9498,7 @@
                 <a:spcPct val="100000"/>
               </a:lnSpc>
             </a:pPr>
-            <a:fld id="{823B0685-7441-4A05-A74D-6DD0DAD17817}" type="slidenum">
+            <a:fld id="{3D5C32E8-ACFA-45E7-AA36-662D04F10757}" type="slidenum">
               <a:rPr b="0" lang="en-US" sz="900" spc="-1" strike="noStrike">
                 <a:solidFill>
                   <a:srgbClr val="898c9d"/>
@@ -9571,7 +9511,7 @@
                 <a:latin typeface="Arial"/>
                 <a:ea typeface="DejaVu Sans"/>
               </a:rPr>
-              <a:t>1</a:t>
+              <a:t>&lt;number&gt;</a:t>
             </a:fld>
             <a:endParaRPr b="0" lang="en-US" sz="1800" spc="-1" strike="noStrike">
               <a:solidFill>
@@ -9596,7 +9536,7 @@
         <p:spPr>
           <a:xfrm>
             <a:off x="0" y="1673640"/>
-            <a:ext cx="2073960" cy="2859840"/>
+            <a:ext cx="2073600" cy="2859480"/>
           </a:xfrm>
           <a:prstGeom prst="rect">
             <a:avLst/>
@@ -9862,7 +9802,7 @@
         <p:spPr>
           <a:xfrm>
             <a:off x="2327760" y="1541160"/>
-            <a:ext cx="6266880" cy="927000"/>
+            <a:ext cx="6266520" cy="926640"/>
           </a:xfrm>
           <a:prstGeom prst="rect">
             <a:avLst/>
@@ -9899,7 +9839,58 @@
                 <a:latin typeface="Arial"/>
                 <a:ea typeface="Arial"/>
               </a:rPr>
-              <a:t>Um sistema de votação independente de software e que grava os registros digitais de votos numa base de dados autônoma e resistente a censura. Foi escrito um contrato inteligente na linguagem </a:t>
+              <a:t>Um sistema de votação independente de software e que grava os registros digitais de votos numa base de dados autônoma e resistente a censura e modificações. </a:t>
+            </a:r>
+            <a:endParaRPr b="0" lang="en-US" sz="1800" spc="-1" strike="noStrike">
+              <a:solidFill>
+                <a:srgbClr val="000000"/>
+              </a:solidFill>
+              <a:uFill>
+                <a:solidFill>
+                  <a:srgbClr val="ffffff"/>
+                </a:solidFill>
+              </a:uFill>
+              <a:latin typeface="Arial"/>
+            </a:endParaRPr>
+          </a:p>
+          <a:p>
+            <a:pPr algn="just">
+              <a:lnSpc>
+                <a:spcPct val="100000"/>
+              </a:lnSpc>
+            </a:pPr>
+            <a:endParaRPr b="0" lang="en-US" sz="1800" spc="-1" strike="noStrike">
+              <a:solidFill>
+                <a:srgbClr val="000000"/>
+              </a:solidFill>
+              <a:uFill>
+                <a:solidFill>
+                  <a:srgbClr val="ffffff"/>
+                </a:solidFill>
+              </a:uFill>
+              <a:latin typeface="Arial"/>
+            </a:endParaRPr>
+          </a:p>
+          <a:p>
+            <a:pPr algn="just">
+              <a:lnSpc>
+                <a:spcPct val="100000"/>
+              </a:lnSpc>
+            </a:pPr>
+            <a:r>
+              <a:rPr b="0" lang="en-US" sz="2200" spc="-1" strike="noStrike">
+                <a:solidFill>
+                  <a:srgbClr val="002060"/>
+                </a:solidFill>
+                <a:uFill>
+                  <a:solidFill>
+                    <a:srgbClr val="ffffff"/>
+                  </a:solidFill>
+                </a:uFill>
+                <a:latin typeface="Arial"/>
+                <a:ea typeface="Arial"/>
+              </a:rPr>
+              <a:t>O software foi escrito na linguagem </a:t>
             </a:r>
             <a:r>
               <a:rPr b="0" i="1" lang="en-US" sz="2200" spc="-1" strike="noStrike">
@@ -10234,7 +10225,7 @@
         <p:spPr>
           <a:xfrm>
             <a:off x="3006720" y="536040"/>
-            <a:ext cx="3444120" cy="576720"/>
+            <a:ext cx="3443760" cy="576360"/>
           </a:xfrm>
           <a:prstGeom prst="rect">
             <a:avLst/>
@@ -10296,7 +10287,7 @@
         <p:spPr>
           <a:xfrm>
             <a:off x="2082240" y="1086840"/>
-            <a:ext cx="44280" cy="5789880"/>
+            <a:ext cx="43920" cy="5789520"/>
           </a:xfrm>
           <a:prstGeom prst="rect">
             <a:avLst/>
@@ -10329,7 +10320,7 @@
         <p:spPr>
           <a:xfrm>
             <a:off x="0" y="4252680"/>
-            <a:ext cx="2080800" cy="44280"/>
+            <a:ext cx="2080440" cy="43920"/>
           </a:xfrm>
           <a:prstGeom prst="rect">
             <a:avLst/>
@@ -10362,7 +10353,7 @@
         <p:spPr>
           <a:xfrm>
             <a:off x="6553080" y="6356520"/>
-            <a:ext cx="2132280" cy="363600"/>
+            <a:ext cx="2131920" cy="363240"/>
           </a:xfrm>
           <a:prstGeom prst="rect">
             <a:avLst/>
@@ -10386,7 +10377,7 @@
                 <a:spcPct val="100000"/>
               </a:lnSpc>
             </a:pPr>
-            <a:fld id="{46D7C701-B403-4FC6-9876-CC4771AF720D}" type="slidenum">
+            <a:fld id="{989D001D-6106-4245-8B48-1546D9F220F1}" type="slidenum">
               <a:rPr b="0" lang="en-US" sz="900" spc="-1" strike="noStrike">
                 <a:solidFill>
                   <a:srgbClr val="898c9d"/>
@@ -10399,7 +10390,7 @@
                 <a:latin typeface="Arial"/>
                 <a:ea typeface="DejaVu Sans"/>
               </a:rPr>
-              <a:t>1</a:t>
+              <a:t>&lt;number&gt;</a:t>
             </a:fld>
             <a:endParaRPr b="0" lang="en-US" sz="1800" spc="-1" strike="noStrike">
               <a:solidFill>
@@ -10424,7 +10415,7 @@
         <p:spPr>
           <a:xfrm>
             <a:off x="0" y="1673640"/>
-            <a:ext cx="2073960" cy="2859840"/>
+            <a:ext cx="2073600" cy="2859480"/>
           </a:xfrm>
           <a:prstGeom prst="rect">
             <a:avLst/>
@@ -10690,7 +10681,7 @@
         <p:spPr>
           <a:xfrm>
             <a:off x="2327760" y="1541160"/>
-            <a:ext cx="6266880" cy="927000"/>
+            <a:ext cx="6266520" cy="926640"/>
           </a:xfrm>
           <a:prstGeom prst="rect">
             <a:avLst/>
@@ -10709,7 +10700,7 @@
         <p:txBody>
           <a:bodyPr lIns="90000" rIns="90000" tIns="45000" bIns="45000"/>
           <a:p>
-            <a:pPr marL="216000" indent="-215280" algn="just">
+            <a:pPr marL="216000" indent="-214920" algn="just">
               <a:lnSpc>
                 <a:spcPct val="100000"/>
               </a:lnSpc>
@@ -10778,7 +10769,7 @@
             </a:endParaRPr>
           </a:p>
           <a:p>
-            <a:pPr marL="216000" indent="-215280" algn="just">
+            <a:pPr marL="216000" indent="-214920" algn="just">
               <a:lnSpc>
                 <a:spcPct val="100000"/>
               </a:lnSpc>
@@ -10817,7 +10808,7 @@
             </a:endParaRPr>
           </a:p>
           <a:p>
-            <a:pPr marL="216000" indent="-215280" algn="just">
+            <a:pPr marL="216000" indent="-214920" algn="just">
               <a:lnSpc>
                 <a:spcPct val="100000"/>
               </a:lnSpc>
@@ -10856,7 +10847,7 @@
             </a:endParaRPr>
           </a:p>
           <a:p>
-            <a:pPr marL="216000" indent="-215280" algn="just">
+            <a:pPr marL="216000" indent="-214920" algn="just">
               <a:lnSpc>
                 <a:spcPct val="100000"/>
               </a:lnSpc>
@@ -10972,7 +10963,7 @@
         <p:spPr>
           <a:xfrm>
             <a:off x="3006720" y="536040"/>
-            <a:ext cx="3444120" cy="576720"/>
+            <a:ext cx="3443760" cy="576360"/>
           </a:xfrm>
           <a:prstGeom prst="rect">
             <a:avLst/>
@@ -11034,7 +11025,7 @@
         <p:spPr>
           <a:xfrm>
             <a:off x="2082240" y="1086840"/>
-            <a:ext cx="44280" cy="5789880"/>
+            <a:ext cx="43920" cy="5789520"/>
           </a:xfrm>
           <a:prstGeom prst="rect">
             <a:avLst/>
@@ -11067,7 +11058,7 @@
         <p:spPr>
           <a:xfrm>
             <a:off x="0" y="4252680"/>
-            <a:ext cx="2080800" cy="44280"/>
+            <a:ext cx="2080440" cy="43920"/>
           </a:xfrm>
           <a:prstGeom prst="rect">
             <a:avLst/>
@@ -11100,7 +11091,7 @@
         <p:spPr>
           <a:xfrm>
             <a:off x="6553080" y="6356520"/>
-            <a:ext cx="2132280" cy="363600"/>
+            <a:ext cx="2131920" cy="363240"/>
           </a:xfrm>
           <a:prstGeom prst="rect">
             <a:avLst/>
@@ -11124,7 +11115,7 @@
                 <a:spcPct val="100000"/>
               </a:lnSpc>
             </a:pPr>
-            <a:fld id="{CF5F1BCE-8E54-474E-8848-75295E679B70}" type="slidenum">
+            <a:fld id="{675B92F7-1E71-44E0-B621-611C5B82096B}" type="slidenum">
               <a:rPr b="0" lang="en-US" sz="900" spc="-1" strike="noStrike">
                 <a:solidFill>
                   <a:srgbClr val="898c9d"/>
@@ -11137,7 +11128,7 @@
                 <a:latin typeface="Arial"/>
                 <a:ea typeface="DejaVu Sans"/>
               </a:rPr>
-              <a:t>1</a:t>
+              <a:t>&lt;number&gt;</a:t>
             </a:fld>
             <a:endParaRPr b="0" lang="en-US" sz="1800" spc="-1" strike="noStrike">
               <a:solidFill>
@@ -11162,7 +11153,7 @@
         <p:spPr>
           <a:xfrm>
             <a:off x="0" y="1673640"/>
-            <a:ext cx="2073960" cy="2859840"/>
+            <a:ext cx="2073600" cy="2859480"/>
           </a:xfrm>
           <a:prstGeom prst="rect">
             <a:avLst/>
@@ -11428,7 +11419,7 @@
         <p:spPr>
           <a:xfrm>
             <a:off x="2327760" y="1541160"/>
-            <a:ext cx="6266880" cy="927000"/>
+            <a:ext cx="6266520" cy="926640"/>
           </a:xfrm>
           <a:prstGeom prst="rect">
             <a:avLst/>
@@ -11447,7 +11438,7 @@
         <p:txBody>
           <a:bodyPr lIns="90000" rIns="90000" tIns="45000" bIns="45000"/>
           <a:p>
-            <a:pPr marL="216000" indent="-215280" algn="just">
+            <a:pPr marL="216000" indent="-214920" algn="just">
               <a:lnSpc>
                 <a:spcPct val="100000"/>
               </a:lnSpc>
@@ -11486,7 +11477,7 @@
             </a:endParaRPr>
           </a:p>
           <a:p>
-            <a:pPr marL="216000" indent="-215280" algn="just">
+            <a:pPr marL="216000" indent="-214920" algn="just">
               <a:lnSpc>
                 <a:spcPct val="100000"/>
               </a:lnSpc>
@@ -11525,7 +11516,7 @@
             </a:endParaRPr>
           </a:p>
           <a:p>
-            <a:pPr marL="216000" indent="-215280" algn="just">
+            <a:pPr marL="216000" indent="-214920" algn="just">
               <a:lnSpc>
                 <a:spcPct val="100000"/>
               </a:lnSpc>
@@ -11641,7 +11632,7 @@
         <p:spPr>
           <a:xfrm>
             <a:off x="3006720" y="536040"/>
-            <a:ext cx="3444120" cy="576720"/>
+            <a:ext cx="3443760" cy="576360"/>
           </a:xfrm>
           <a:prstGeom prst="rect">
             <a:avLst/>
@@ -11703,7 +11694,7 @@
         <p:spPr>
           <a:xfrm>
             <a:off x="2082240" y="1086840"/>
-            <a:ext cx="44280" cy="5789880"/>
+            <a:ext cx="43920" cy="5789520"/>
           </a:xfrm>
           <a:prstGeom prst="rect">
             <a:avLst/>
@@ -11736,7 +11727,7 @@
         <p:spPr>
           <a:xfrm>
             <a:off x="0" y="4252680"/>
-            <a:ext cx="2080800" cy="44280"/>
+            <a:ext cx="2080440" cy="43920"/>
           </a:xfrm>
           <a:prstGeom prst="rect">
             <a:avLst/>
@@ -11769,7 +11760,7 @@
         <p:spPr>
           <a:xfrm>
             <a:off x="6553080" y="6356520"/>
-            <a:ext cx="2132280" cy="363600"/>
+            <a:ext cx="2131920" cy="363240"/>
           </a:xfrm>
           <a:prstGeom prst="rect">
             <a:avLst/>
@@ -11793,7 +11784,7 @@
                 <a:spcPct val="100000"/>
               </a:lnSpc>
             </a:pPr>
-            <a:fld id="{25C4569F-0219-4D4E-BE82-8BEA5EAD9818}" type="slidenum">
+            <a:fld id="{5ADECBFA-BC97-440E-9906-1FAFD4E9D1D4}" type="slidenum">
               <a:rPr b="0" lang="en-US" sz="900" spc="-1" strike="noStrike">
                 <a:solidFill>
                   <a:srgbClr val="898c9d"/>
@@ -11806,7 +11797,7 @@
                 <a:latin typeface="Arial"/>
                 <a:ea typeface="DejaVu Sans"/>
               </a:rPr>
-              <a:t>1</a:t>
+              <a:t>&lt;number&gt;</a:t>
             </a:fld>
             <a:endParaRPr b="0" lang="en-US" sz="1800" spc="-1" strike="noStrike">
               <a:solidFill>
@@ -11831,7 +11822,7 @@
         <p:spPr>
           <a:xfrm>
             <a:off x="0" y="1673640"/>
-            <a:ext cx="2073960" cy="2859840"/>
+            <a:ext cx="2073600" cy="2859480"/>
           </a:xfrm>
           <a:prstGeom prst="rect">
             <a:avLst/>
@@ -12097,7 +12088,7 @@
         <p:spPr>
           <a:xfrm>
             <a:off x="2327760" y="1541160"/>
-            <a:ext cx="6266880" cy="927000"/>
+            <a:ext cx="6266520" cy="926640"/>
           </a:xfrm>
           <a:prstGeom prst="rect">
             <a:avLst/>
@@ -12116,7 +12107,7 @@
         <p:txBody>
           <a:bodyPr lIns="90000" rIns="90000" tIns="45000" bIns="45000"/>
           <a:p>
-            <a:pPr marL="216000" indent="-215280" algn="just">
+            <a:pPr marL="216000" indent="-214920" algn="just">
               <a:lnSpc>
                 <a:spcPct val="100000"/>
               </a:lnSpc>
@@ -12182,13 +12173,13 @@
         </p:nvPicPr>
         <p:blipFill>
           <a:blip r:embed="rId1"/>
-          <a:srcRect l="50299" t="36166" r="20716" b="40723"/>
+          <a:srcRect l="50307" t="36171" r="20718" b="40728"/>
           <a:stretch/>
         </p:blipFill>
         <p:spPr>
           <a:xfrm>
             <a:off x="2651760" y="3108960"/>
-            <a:ext cx="5036760" cy="2256840"/>
+            <a:ext cx="5714640" cy="2560320"/>
           </a:xfrm>
           <a:prstGeom prst="rect">
             <a:avLst/>
@@ -12256,7 +12247,7 @@
         <p:spPr>
           <a:xfrm>
             <a:off x="3006720" y="536040"/>
-            <a:ext cx="3444120" cy="576720"/>
+            <a:ext cx="3443760" cy="576360"/>
           </a:xfrm>
           <a:prstGeom prst="rect">
             <a:avLst/>
@@ -12318,7 +12309,7 @@
         <p:spPr>
           <a:xfrm>
             <a:off x="2082240" y="1086840"/>
-            <a:ext cx="44280" cy="5789880"/>
+            <a:ext cx="43920" cy="5789520"/>
           </a:xfrm>
           <a:prstGeom prst="rect">
             <a:avLst/>
@@ -12351,7 +12342,7 @@
         <p:spPr>
           <a:xfrm>
             <a:off x="0" y="4252680"/>
-            <a:ext cx="2080800" cy="44280"/>
+            <a:ext cx="2080440" cy="43920"/>
           </a:xfrm>
           <a:prstGeom prst="rect">
             <a:avLst/>
@@ -12384,7 +12375,7 @@
         <p:spPr>
           <a:xfrm>
             <a:off x="6553080" y="6356520"/>
-            <a:ext cx="2132280" cy="363600"/>
+            <a:ext cx="2131920" cy="363240"/>
           </a:xfrm>
           <a:prstGeom prst="rect">
             <a:avLst/>
@@ -12408,7 +12399,7 @@
                 <a:spcPct val="100000"/>
               </a:lnSpc>
             </a:pPr>
-            <a:fld id="{80510F63-98D7-444C-9129-8646B3E3B18E}" type="slidenum">
+            <a:fld id="{F8BEE3A3-0348-4F6E-BE7A-6E552CF8C621}" type="slidenum">
               <a:rPr b="0" lang="en-US" sz="900" spc="-1" strike="noStrike">
                 <a:solidFill>
                   <a:srgbClr val="898c9d"/>
@@ -12421,7 +12412,7 @@
                 <a:latin typeface="Arial"/>
                 <a:ea typeface="DejaVu Sans"/>
               </a:rPr>
-              <a:t>1</a:t>
+              <a:t>&lt;number&gt;</a:t>
             </a:fld>
             <a:endParaRPr b="0" lang="en-US" sz="1800" spc="-1" strike="noStrike">
               <a:solidFill>
@@ -12446,7 +12437,7 @@
         <p:spPr>
           <a:xfrm>
             <a:off x="0" y="1673640"/>
-            <a:ext cx="2073960" cy="2859840"/>
+            <a:ext cx="2073600" cy="2859480"/>
           </a:xfrm>
           <a:prstGeom prst="rect">
             <a:avLst/>
@@ -12717,7 +12708,7 @@
         <p:spPr>
           <a:xfrm>
             <a:off x="2286000" y="1266480"/>
-            <a:ext cx="6607080" cy="3670560"/>
+            <a:ext cx="6606720" cy="3670200"/>
           </a:xfrm>
           <a:prstGeom prst="rect">
             <a:avLst/>
@@ -12735,13 +12726,13 @@
         </p:nvPicPr>
         <p:blipFill>
           <a:blip r:embed="rId2"/>
-          <a:srcRect l="6737" t="36043" r="8992" b="26836"/>
+          <a:srcRect l="6737" t="36048" r="8992" b="26841"/>
           <a:stretch/>
         </p:blipFill>
         <p:spPr>
           <a:xfrm>
             <a:off x="2286000" y="4937760"/>
-            <a:ext cx="6642720" cy="1644840"/>
+            <a:ext cx="6642360" cy="1644480"/>
           </a:xfrm>
           <a:prstGeom prst="rect">
             <a:avLst/>
@@ -12809,7 +12800,7 @@
         <p:spPr>
           <a:xfrm>
             <a:off x="3006720" y="536040"/>
-            <a:ext cx="3444120" cy="576720"/>
+            <a:ext cx="3443760" cy="576360"/>
           </a:xfrm>
           <a:prstGeom prst="rect">
             <a:avLst/>
@@ -12871,7 +12862,7 @@
         <p:spPr>
           <a:xfrm>
             <a:off x="2082240" y="1086840"/>
-            <a:ext cx="44280" cy="5789880"/>
+            <a:ext cx="43920" cy="5789520"/>
           </a:xfrm>
           <a:prstGeom prst="rect">
             <a:avLst/>
@@ -12904,7 +12895,7 @@
         <p:spPr>
           <a:xfrm>
             <a:off x="0" y="4252680"/>
-            <a:ext cx="2080800" cy="44280"/>
+            <a:ext cx="2080440" cy="43920"/>
           </a:xfrm>
           <a:prstGeom prst="rect">
             <a:avLst/>
@@ -12937,7 +12928,7 @@
         <p:spPr>
           <a:xfrm>
             <a:off x="6553080" y="6356520"/>
-            <a:ext cx="2132280" cy="363600"/>
+            <a:ext cx="2131920" cy="363240"/>
           </a:xfrm>
           <a:prstGeom prst="rect">
             <a:avLst/>
@@ -12961,7 +12952,7 @@
                 <a:spcPct val="100000"/>
               </a:lnSpc>
             </a:pPr>
-            <a:fld id="{4CB6EAFC-72A0-4AB7-BCAC-2FF9C3A8DBFE}" type="slidenum">
+            <a:fld id="{FE2F24FA-7D86-4E8A-968F-4594EDB60482}" type="slidenum">
               <a:rPr b="0" lang="en-US" sz="900" spc="-1" strike="noStrike">
                 <a:solidFill>
                   <a:srgbClr val="898c9d"/>
@@ -12974,7 +12965,7 @@
                 <a:latin typeface="Arial"/>
                 <a:ea typeface="DejaVu Sans"/>
               </a:rPr>
-              <a:t>1</a:t>
+              <a:t>&lt;number&gt;</a:t>
             </a:fld>
             <a:endParaRPr b="0" lang="en-US" sz="1800" spc="-1" strike="noStrike">
               <a:solidFill>
@@ -12999,7 +12990,7 @@
         <p:spPr>
           <a:xfrm>
             <a:off x="0" y="1673640"/>
-            <a:ext cx="2073960" cy="2859840"/>
+            <a:ext cx="2073600" cy="2859480"/>
           </a:xfrm>
           <a:prstGeom prst="rect">
             <a:avLst/>
@@ -13270,7 +13261,7 @@
         <p:spPr>
           <a:xfrm>
             <a:off x="2127240" y="1097280"/>
-            <a:ext cx="7016040" cy="5851080"/>
+            <a:ext cx="7015680" cy="5850720"/>
           </a:xfrm>
           <a:prstGeom prst="rect">
             <a:avLst/>
@@ -13338,7 +13329,7 @@
         <p:spPr>
           <a:xfrm>
             <a:off x="3079440" y="536040"/>
-            <a:ext cx="2983680" cy="576720"/>
+            <a:ext cx="2983320" cy="576360"/>
           </a:xfrm>
           <a:prstGeom prst="rect">
             <a:avLst/>
@@ -13400,7 +13391,7 @@
         <p:spPr>
           <a:xfrm>
             <a:off x="2319120" y="1645200"/>
-            <a:ext cx="6266880" cy="927000"/>
+            <a:ext cx="6266520" cy="926640"/>
           </a:xfrm>
           <a:prstGeom prst="rect">
             <a:avLst/>
@@ -13536,39 +13527,6 @@
                 <a:latin typeface="Arial"/>
                 <a:ea typeface="DejaVu Sans"/>
               </a:rPr>
-              <a:t>O Caso Alagoas – 2006</a:t>
-            </a:r>
-            <a:endParaRPr b="0" lang="en-US" sz="1800" spc="-1" strike="noStrike">
-              <a:solidFill>
-                <a:srgbClr val="000000"/>
-              </a:solidFill>
-              <a:uFill>
-                <a:solidFill>
-                  <a:srgbClr val="ffffff"/>
-                </a:solidFill>
-              </a:uFill>
-              <a:latin typeface="Arial"/>
-            </a:endParaRPr>
-          </a:p>
-          <a:p>
-            <a:pPr>
-              <a:lnSpc>
-                <a:spcPct val="150000"/>
-              </a:lnSpc>
-            </a:pPr>
-            <a:r>
-              <a:rPr b="0" lang="en-US" sz="2200" spc="-1" strike="noStrike">
-                <a:solidFill>
-                  <a:srgbClr val="002060"/>
-                </a:solidFill>
-                <a:uFill>
-                  <a:solidFill>
-                    <a:srgbClr val="ffffff"/>
-                  </a:solidFill>
-                </a:uFill>
-                <a:latin typeface="Arial"/>
-                <a:ea typeface="DejaVu Sans"/>
-              </a:rPr>
               <a:t>O Caso Itajaí, SC - 2008</a:t>
             </a:r>
             <a:endParaRPr b="0" lang="en-US" sz="1800" spc="-1" strike="noStrike">
@@ -13612,7 +13570,7 @@
         <p:spPr>
           <a:xfrm>
             <a:off x="2082240" y="1086840"/>
-            <a:ext cx="44280" cy="5789880"/>
+            <a:ext cx="43920" cy="5789520"/>
           </a:xfrm>
           <a:prstGeom prst="rect">
             <a:avLst/>
@@ -13645,7 +13603,7 @@
         <p:spPr>
           <a:xfrm>
             <a:off x="0" y="2017080"/>
-            <a:ext cx="2080800" cy="44280"/>
+            <a:ext cx="2080440" cy="43920"/>
           </a:xfrm>
           <a:prstGeom prst="rect">
             <a:avLst/>
@@ -13678,7 +13636,7 @@
         <p:spPr>
           <a:xfrm>
             <a:off x="6553080" y="6356520"/>
-            <a:ext cx="2132280" cy="363600"/>
+            <a:ext cx="2131920" cy="363240"/>
           </a:xfrm>
           <a:prstGeom prst="rect">
             <a:avLst/>
@@ -13702,7 +13660,7 @@
                 <a:spcPct val="100000"/>
               </a:lnSpc>
             </a:pPr>
-            <a:fld id="{9CE5823F-826E-47A9-AE5B-C951954E049C}" type="slidenum">
+            <a:fld id="{944B9BB8-89F0-484B-B2F4-3CDE77C1CD6A}" type="slidenum">
               <a:rPr b="0" lang="en-US" sz="900" spc="-1" strike="noStrike">
                 <a:solidFill>
                   <a:srgbClr val="898c9d"/>
@@ -13715,7 +13673,7 @@
                 <a:latin typeface="Arial"/>
                 <a:ea typeface="DejaVu Sans"/>
               </a:rPr>
-              <a:t>1</a:t>
+              <a:t>&lt;number&gt;</a:t>
             </a:fld>
             <a:endParaRPr b="0" lang="en-US" sz="1800" spc="-1" strike="noStrike">
               <a:solidFill>
@@ -13740,7 +13698,7 @@
         <p:spPr>
           <a:xfrm>
             <a:off x="0" y="1673640"/>
-            <a:ext cx="2073960" cy="2859840"/>
+            <a:ext cx="2073600" cy="2859480"/>
           </a:xfrm>
           <a:prstGeom prst="rect">
             <a:avLst/>
@@ -14055,7 +14013,7 @@
         <p:spPr>
           <a:xfrm>
             <a:off x="1383840" y="536040"/>
-            <a:ext cx="6102720" cy="576720"/>
+            <a:ext cx="6102360" cy="576360"/>
           </a:xfrm>
           <a:prstGeom prst="rect">
             <a:avLst/>
@@ -14117,7 +14075,7 @@
         <p:spPr>
           <a:xfrm>
             <a:off x="2082240" y="1086840"/>
-            <a:ext cx="44280" cy="5789880"/>
+            <a:ext cx="43920" cy="5789520"/>
           </a:xfrm>
           <a:prstGeom prst="rect">
             <a:avLst/>
@@ -14150,7 +14108,7 @@
         <p:spPr>
           <a:xfrm>
             <a:off x="0" y="4984200"/>
-            <a:ext cx="2080800" cy="44280"/>
+            <a:ext cx="2080440" cy="43920"/>
           </a:xfrm>
           <a:prstGeom prst="rect">
             <a:avLst/>
@@ -14183,7 +14141,7 @@
         <p:spPr>
           <a:xfrm>
             <a:off x="6553080" y="6356520"/>
-            <a:ext cx="2132280" cy="363600"/>
+            <a:ext cx="2131920" cy="363240"/>
           </a:xfrm>
           <a:prstGeom prst="rect">
             <a:avLst/>
@@ -14207,7 +14165,7 @@
                 <a:spcPct val="100000"/>
               </a:lnSpc>
             </a:pPr>
-            <a:fld id="{889A43FF-FEF4-4D6B-AB73-006B9CE32569}" type="slidenum">
+            <a:fld id="{3872899E-818A-4181-906F-F9C90695E31C}" type="slidenum">
               <a:rPr b="0" lang="en-US" sz="900" spc="-1" strike="noStrike">
                 <a:solidFill>
                   <a:srgbClr val="898c9d"/>
@@ -14220,7 +14178,7 @@
                 <a:latin typeface="Arial"/>
                 <a:ea typeface="DejaVu Sans"/>
               </a:rPr>
-              <a:t>1</a:t>
+              <a:t>&lt;number&gt;</a:t>
             </a:fld>
             <a:endParaRPr b="0" lang="en-US" sz="1800" spc="-1" strike="noStrike">
               <a:solidFill>
@@ -14245,7 +14203,7 @@
         <p:spPr>
           <a:xfrm>
             <a:off x="0" y="1673640"/>
-            <a:ext cx="2073960" cy="2859840"/>
+            <a:ext cx="2073600" cy="2859480"/>
           </a:xfrm>
           <a:prstGeom prst="rect">
             <a:avLst/>
@@ -14511,7 +14469,7 @@
         <p:spPr>
           <a:xfrm>
             <a:off x="2327760" y="1751040"/>
-            <a:ext cx="6266880" cy="927000"/>
+            <a:ext cx="6266520" cy="926640"/>
           </a:xfrm>
           <a:prstGeom prst="rect">
             <a:avLst/>
@@ -14724,7 +14682,7 @@
         <p:spPr>
           <a:xfrm>
             <a:off x="1596600" y="3004560"/>
-            <a:ext cx="6266880" cy="927000"/>
+            <a:ext cx="6266520" cy="926640"/>
           </a:xfrm>
           <a:prstGeom prst="rect">
             <a:avLst/>
@@ -14853,7 +14811,7 @@
         <p:spPr>
           <a:xfrm>
             <a:off x="1383840" y="536040"/>
-            <a:ext cx="6102720" cy="576720"/>
+            <a:ext cx="6102360" cy="576360"/>
           </a:xfrm>
           <a:prstGeom prst="rect">
             <a:avLst/>
@@ -14879,7 +14837,7 @@
         <p:spPr>
           <a:xfrm>
             <a:off x="91440" y="1005840"/>
-            <a:ext cx="8137800" cy="182520"/>
+            <a:ext cx="8137440" cy="182160"/>
           </a:xfrm>
           <a:prstGeom prst="rect">
             <a:avLst/>
@@ -14907,7 +14865,7 @@
         <p:spPr>
           <a:xfrm>
             <a:off x="1463040" y="1891800"/>
-            <a:ext cx="6102720" cy="576720"/>
+            <a:ext cx="6102360" cy="576360"/>
           </a:xfrm>
           <a:prstGeom prst="rect">
             <a:avLst/>
@@ -15018,7 +14976,7 @@
         <p:spPr>
           <a:xfrm>
             <a:off x="3079440" y="536040"/>
-            <a:ext cx="2983680" cy="576720"/>
+            <a:ext cx="2983320" cy="576360"/>
           </a:xfrm>
           <a:prstGeom prst="rect">
             <a:avLst/>
@@ -15080,7 +15038,7 @@
         <p:spPr>
           <a:xfrm>
             <a:off x="2319120" y="1645200"/>
-            <a:ext cx="6266880" cy="2936520"/>
+            <a:ext cx="6266520" cy="2936160"/>
           </a:xfrm>
           <a:prstGeom prst="rect">
             <a:avLst/>
@@ -15132,7 +15090,7 @@
             </a:endParaRPr>
           </a:p>
           <a:p>
-            <a:pPr marL="257040" indent="-255600">
+            <a:pPr marL="257040" indent="-255240">
               <a:lnSpc>
                 <a:spcPct val="150000"/>
               </a:lnSpc>
@@ -15171,7 +15129,7 @@
             </a:endParaRPr>
           </a:p>
           <a:p>
-            <a:pPr marL="257040" indent="-255600">
+            <a:pPr marL="257040" indent="-255240">
               <a:lnSpc>
                 <a:spcPct val="150000"/>
               </a:lnSpc>
@@ -15210,7 +15168,7 @@
             </a:endParaRPr>
           </a:p>
           <a:p>
-            <a:pPr marL="257040" indent="-255600">
+            <a:pPr marL="257040" indent="-255240">
               <a:lnSpc>
                 <a:spcPct val="150000"/>
               </a:lnSpc>
@@ -15249,7 +15207,7 @@
             </a:endParaRPr>
           </a:p>
           <a:p>
-            <a:pPr marL="257040" indent="-255600">
+            <a:pPr marL="257040" indent="-255240">
               <a:lnSpc>
                 <a:spcPct val="150000"/>
               </a:lnSpc>
@@ -15288,7 +15246,7 @@
             </a:endParaRPr>
           </a:p>
           <a:p>
-            <a:pPr marL="257040" indent="-255600">
+            <a:pPr marL="257040" indent="-255240">
               <a:lnSpc>
                 <a:spcPct val="150000"/>
               </a:lnSpc>
@@ -15355,7 +15313,7 @@
         <p:spPr>
           <a:xfrm>
             <a:off x="2082240" y="1086840"/>
-            <a:ext cx="44280" cy="5789880"/>
+            <a:ext cx="43920" cy="5789520"/>
           </a:xfrm>
           <a:prstGeom prst="rect">
             <a:avLst/>
@@ -15388,7 +15346,7 @@
         <p:spPr>
           <a:xfrm>
             <a:off x="0" y="2017080"/>
-            <a:ext cx="2080800" cy="44280"/>
+            <a:ext cx="2080440" cy="43920"/>
           </a:xfrm>
           <a:prstGeom prst="rect">
             <a:avLst/>
@@ -15421,7 +15379,7 @@
         <p:spPr>
           <a:xfrm>
             <a:off x="6553080" y="6356520"/>
-            <a:ext cx="2132280" cy="363600"/>
+            <a:ext cx="2131920" cy="363240"/>
           </a:xfrm>
           <a:prstGeom prst="rect">
             <a:avLst/>
@@ -15445,7 +15403,7 @@
                 <a:spcPct val="100000"/>
               </a:lnSpc>
             </a:pPr>
-            <a:fld id="{EE39AE3C-3603-47F5-931B-58F9753691E0}" type="slidenum">
+            <a:fld id="{8FE6F3CF-58CD-4396-8DE4-901FACBC6B21}" type="slidenum">
               <a:rPr b="0" lang="en-US" sz="900" spc="-1" strike="noStrike">
                 <a:solidFill>
                   <a:srgbClr val="898c9d"/>
@@ -15458,7 +15416,7 @@
                 <a:latin typeface="Arial"/>
                 <a:ea typeface="DejaVu Sans"/>
               </a:rPr>
-              <a:t>1</a:t>
+              <a:t>&lt;number&gt;</a:t>
             </a:fld>
             <a:endParaRPr b="0" lang="en-US" sz="1800" spc="-1" strike="noStrike">
               <a:solidFill>
@@ -15483,7 +15441,7 @@
         <p:spPr>
           <a:xfrm>
             <a:off x="0" y="1673640"/>
-            <a:ext cx="2073960" cy="2859840"/>
+            <a:ext cx="2073600" cy="2859480"/>
           </a:xfrm>
           <a:prstGeom prst="rect">
             <a:avLst/>
@@ -15798,7 +15756,7 @@
         <p:spPr>
           <a:xfrm>
             <a:off x="3079440" y="536040"/>
-            <a:ext cx="2983680" cy="576720"/>
+            <a:ext cx="2983320" cy="576360"/>
           </a:xfrm>
           <a:prstGeom prst="rect">
             <a:avLst/>
@@ -15860,7 +15818,7 @@
         <p:spPr>
           <a:xfrm>
             <a:off x="2319120" y="1645200"/>
-            <a:ext cx="6266880" cy="4444200"/>
+            <a:ext cx="6266520" cy="4443840"/>
           </a:xfrm>
           <a:prstGeom prst="rect">
             <a:avLst/>
@@ -15912,7 +15870,7 @@
             </a:endParaRPr>
           </a:p>
           <a:p>
-            <a:pPr lvl="1" marL="432000" indent="-214920">
+            <a:pPr lvl="1" marL="432000" indent="-214560">
               <a:lnSpc>
                 <a:spcPct val="150000"/>
               </a:lnSpc>
@@ -15951,7 +15909,7 @@
             </a:endParaRPr>
           </a:p>
           <a:p>
-            <a:pPr lvl="1" marL="432000" indent="-214920">
+            <a:pPr lvl="1" marL="432000" indent="-214560">
               <a:lnSpc>
                 <a:spcPct val="150000"/>
               </a:lnSpc>
@@ -15990,7 +15948,7 @@
             </a:endParaRPr>
           </a:p>
           <a:p>
-            <a:pPr lvl="1" marL="432000" indent="-214920">
+            <a:pPr lvl="1" marL="432000" indent="-214560">
               <a:lnSpc>
                 <a:spcPct val="150000"/>
               </a:lnSpc>
@@ -16029,7 +15987,7 @@
             </a:endParaRPr>
           </a:p>
           <a:p>
-            <a:pPr lvl="1" marL="432000" indent="-214920">
+            <a:pPr lvl="1" marL="432000" indent="-214560">
               <a:lnSpc>
                 <a:spcPct val="150000"/>
               </a:lnSpc>
@@ -16068,7 +16026,7 @@
             </a:endParaRPr>
           </a:p>
           <a:p>
-            <a:pPr lvl="1" marL="432000" indent="-214920">
+            <a:pPr lvl="1" marL="432000" indent="-214560">
               <a:lnSpc>
                 <a:spcPct val="150000"/>
               </a:lnSpc>
@@ -16135,7 +16093,7 @@
         <p:spPr>
           <a:xfrm>
             <a:off x="2082240" y="1086840"/>
-            <a:ext cx="44280" cy="5789880"/>
+            <a:ext cx="43920" cy="5789520"/>
           </a:xfrm>
           <a:prstGeom prst="rect">
             <a:avLst/>
@@ -16168,7 +16126,7 @@
         <p:spPr>
           <a:xfrm>
             <a:off x="0" y="2017080"/>
-            <a:ext cx="2080800" cy="44280"/>
+            <a:ext cx="2080440" cy="43920"/>
           </a:xfrm>
           <a:prstGeom prst="rect">
             <a:avLst/>
@@ -16201,7 +16159,7 @@
         <p:spPr>
           <a:xfrm>
             <a:off x="6553080" y="6356520"/>
-            <a:ext cx="2132280" cy="363600"/>
+            <a:ext cx="2131920" cy="363240"/>
           </a:xfrm>
           <a:prstGeom prst="rect">
             <a:avLst/>
@@ -16225,7 +16183,7 @@
                 <a:spcPct val="100000"/>
               </a:lnSpc>
             </a:pPr>
-            <a:fld id="{A96B6846-6F48-4AA2-8A90-325668B8AD25}" type="slidenum">
+            <a:fld id="{575737AE-8E29-496E-B25C-10D6C864AA9B}" type="slidenum">
               <a:rPr b="0" lang="en-US" sz="900" spc="-1" strike="noStrike">
                 <a:solidFill>
                   <a:srgbClr val="898c9d"/>
@@ -16238,7 +16196,7 @@
                 <a:latin typeface="Arial"/>
                 <a:ea typeface="DejaVu Sans"/>
               </a:rPr>
-              <a:t>1</a:t>
+              <a:t>&lt;number&gt;</a:t>
             </a:fld>
             <a:endParaRPr b="0" lang="en-US" sz="1800" spc="-1" strike="noStrike">
               <a:solidFill>
@@ -16263,7 +16221,7 @@
         <p:spPr>
           <a:xfrm>
             <a:off x="0" y="1673640"/>
-            <a:ext cx="2073960" cy="2859840"/>
+            <a:ext cx="2073600" cy="2859480"/>
           </a:xfrm>
           <a:prstGeom prst="rect">
             <a:avLst/>
@@ -16578,7 +16536,7 @@
         <p:spPr>
           <a:xfrm>
             <a:off x="3079440" y="536040"/>
-            <a:ext cx="2983680" cy="576720"/>
+            <a:ext cx="2983320" cy="576360"/>
           </a:xfrm>
           <a:prstGeom prst="rect">
             <a:avLst/>
@@ -16640,7 +16598,7 @@
         <p:spPr>
           <a:xfrm>
             <a:off x="2319120" y="1645200"/>
-            <a:ext cx="6266880" cy="1428840"/>
+            <a:ext cx="6266520" cy="1428480"/>
           </a:xfrm>
           <a:prstGeom prst="rect">
             <a:avLst/>
@@ -16692,7 +16650,7 @@
             </a:endParaRPr>
           </a:p>
           <a:p>
-            <a:pPr marL="257040" indent="-255600">
+            <a:pPr marL="257040" indent="-255240">
               <a:lnSpc>
                 <a:spcPct val="150000"/>
               </a:lnSpc>
@@ -16731,7 +16689,7 @@
             </a:endParaRPr>
           </a:p>
           <a:p>
-            <a:pPr marL="257040" indent="-255600">
+            <a:pPr marL="257040" indent="-255240">
               <a:lnSpc>
                 <a:spcPct val="150000"/>
               </a:lnSpc>
@@ -16770,7 +16728,7 @@
             </a:endParaRPr>
           </a:p>
           <a:p>
-            <a:pPr marL="257040" indent="-255600">
+            <a:pPr marL="257040" indent="-255240">
               <a:lnSpc>
                 <a:spcPct val="150000"/>
               </a:lnSpc>
@@ -16837,7 +16795,7 @@
         <p:spPr>
           <a:xfrm>
             <a:off x="2082240" y="1086840"/>
-            <a:ext cx="44280" cy="5789880"/>
+            <a:ext cx="43920" cy="5789520"/>
           </a:xfrm>
           <a:prstGeom prst="rect">
             <a:avLst/>
@@ -16870,7 +16828,7 @@
         <p:spPr>
           <a:xfrm>
             <a:off x="0" y="2017080"/>
-            <a:ext cx="2080800" cy="44280"/>
+            <a:ext cx="2080440" cy="43920"/>
           </a:xfrm>
           <a:prstGeom prst="rect">
             <a:avLst/>
@@ -16903,7 +16861,7 @@
         <p:spPr>
           <a:xfrm>
             <a:off x="6553080" y="6356520"/>
-            <a:ext cx="2132280" cy="363600"/>
+            <a:ext cx="2131920" cy="363240"/>
           </a:xfrm>
           <a:prstGeom prst="rect">
             <a:avLst/>
@@ -16927,7 +16885,7 @@
                 <a:spcPct val="100000"/>
               </a:lnSpc>
             </a:pPr>
-            <a:fld id="{F795F9CC-438A-4EFF-A3DF-5FB6608F3489}" type="slidenum">
+            <a:fld id="{90ADA75E-2BD9-4A88-B9CD-BD1B134A1D12}" type="slidenum">
               <a:rPr b="0" lang="en-US" sz="900" spc="-1" strike="noStrike">
                 <a:solidFill>
                   <a:srgbClr val="898c9d"/>
@@ -16940,7 +16898,7 @@
                 <a:latin typeface="Arial"/>
                 <a:ea typeface="DejaVu Sans"/>
               </a:rPr>
-              <a:t>1</a:t>
+              <a:t>&lt;number&gt;</a:t>
             </a:fld>
             <a:endParaRPr b="0" lang="en-US" sz="1800" spc="-1" strike="noStrike">
               <a:solidFill>
@@ -16965,7 +16923,7 @@
         <p:spPr>
           <a:xfrm>
             <a:off x="0" y="1673640"/>
-            <a:ext cx="2073960" cy="2859840"/>
+            <a:ext cx="2073600" cy="2859480"/>
           </a:xfrm>
           <a:prstGeom prst="rect">
             <a:avLst/>
@@ -17231,7 +17189,7 @@
         <p:spPr>
           <a:xfrm>
             <a:off x="3749040" y="5852160"/>
-            <a:ext cx="4822200" cy="345960"/>
+            <a:ext cx="4821840" cy="345600"/>
           </a:xfrm>
           <a:prstGeom prst="rect">
             <a:avLst/>
@@ -17337,7 +17295,7 @@
         <p:spPr>
           <a:xfrm>
             <a:off x="3079440" y="536040"/>
-            <a:ext cx="2983680" cy="576720"/>
+            <a:ext cx="2983320" cy="576360"/>
           </a:xfrm>
           <a:prstGeom prst="rect">
             <a:avLst/>
@@ -17399,7 +17357,7 @@
         <p:spPr>
           <a:xfrm>
             <a:off x="2327400" y="2378520"/>
-            <a:ext cx="6266880" cy="2832480"/>
+            <a:ext cx="6266520" cy="2832120"/>
           </a:xfrm>
           <a:prstGeom prst="rect">
             <a:avLst/>
@@ -17461,7 +17419,7 @@
         <p:spPr>
           <a:xfrm>
             <a:off x="2082240" y="1086840"/>
-            <a:ext cx="44280" cy="5789880"/>
+            <a:ext cx="43920" cy="5789520"/>
           </a:xfrm>
           <a:prstGeom prst="rect">
             <a:avLst/>
@@ -17494,7 +17452,7 @@
         <p:spPr>
           <a:xfrm>
             <a:off x="23040" y="2661480"/>
-            <a:ext cx="2080800" cy="44280"/>
+            <a:ext cx="2080440" cy="43920"/>
           </a:xfrm>
           <a:prstGeom prst="rect">
             <a:avLst/>
@@ -17527,7 +17485,7 @@
         <p:spPr>
           <a:xfrm>
             <a:off x="6553080" y="6356520"/>
-            <a:ext cx="2132280" cy="363600"/>
+            <a:ext cx="2131920" cy="363240"/>
           </a:xfrm>
           <a:prstGeom prst="rect">
             <a:avLst/>
@@ -17551,7 +17509,7 @@
                 <a:spcPct val="100000"/>
               </a:lnSpc>
             </a:pPr>
-            <a:fld id="{42693EE1-28B6-4CCF-9EDF-42F89B5A6E3A}" type="slidenum">
+            <a:fld id="{33DCD882-999A-4F82-A49D-D7886DB05CB3}" type="slidenum">
               <a:rPr b="0" lang="en-US" sz="900" spc="-1" strike="noStrike">
                 <a:solidFill>
                   <a:srgbClr val="898c9d"/>
@@ -17564,7 +17522,7 @@
                 <a:latin typeface="Arial"/>
                 <a:ea typeface="DejaVu Sans"/>
               </a:rPr>
-              <a:t>1</a:t>
+              <a:t>&lt;number&gt;</a:t>
             </a:fld>
             <a:endParaRPr b="0" lang="en-US" sz="1800" spc="-1" strike="noStrike">
               <a:solidFill>
@@ -17589,7 +17547,7 @@
         <p:spPr>
           <a:xfrm>
             <a:off x="0" y="1673640"/>
-            <a:ext cx="2073960" cy="2859840"/>
+            <a:ext cx="2073600" cy="2859480"/>
           </a:xfrm>
           <a:prstGeom prst="rect">
             <a:avLst/>
@@ -17904,7 +17862,7 @@
         <p:spPr>
           <a:xfrm>
             <a:off x="2319120" y="501840"/>
-            <a:ext cx="4479120" cy="576720"/>
+            <a:ext cx="4478760" cy="576360"/>
           </a:xfrm>
           <a:prstGeom prst="rect">
             <a:avLst/>
@@ -17966,7 +17924,7 @@
         <p:spPr>
           <a:xfrm>
             <a:off x="2082240" y="1086840"/>
-            <a:ext cx="44280" cy="5789880"/>
+            <a:ext cx="43920" cy="5789520"/>
           </a:xfrm>
           <a:prstGeom prst="rect">
             <a:avLst/>
@@ -17999,7 +17957,7 @@
         <p:spPr>
           <a:xfrm>
             <a:off x="6553080" y="6356520"/>
-            <a:ext cx="2132280" cy="363600"/>
+            <a:ext cx="2131920" cy="363240"/>
           </a:xfrm>
           <a:prstGeom prst="rect">
             <a:avLst/>
@@ -18023,7 +17981,7 @@
                 <a:spcPct val="100000"/>
               </a:lnSpc>
             </a:pPr>
-            <a:fld id="{3E680C15-31D4-4A5A-9D00-DD50B05261C8}" type="slidenum">
+            <a:fld id="{FEBF6102-484C-4442-8B3A-B84172A4A942}" type="slidenum">
               <a:rPr b="0" lang="en-US" sz="900" spc="-1" strike="noStrike">
                 <a:solidFill>
                   <a:srgbClr val="898c9d"/>
@@ -18036,7 +17994,7 @@
                 <a:latin typeface="Arial"/>
                 <a:ea typeface="DejaVu Sans"/>
               </a:rPr>
-              <a:t>1</a:t>
+              <a:t>&lt;number&gt;</a:t>
             </a:fld>
             <a:endParaRPr b="0" lang="en-US" sz="1800" spc="-1" strike="noStrike">
               <a:solidFill>
@@ -18061,7 +18019,7 @@
         <p:spPr>
           <a:xfrm>
             <a:off x="0" y="1673640"/>
-            <a:ext cx="2073960" cy="2859840"/>
+            <a:ext cx="2073600" cy="2859480"/>
           </a:xfrm>
           <a:prstGeom prst="rect">
             <a:avLst/>
@@ -18327,7 +18285,7 @@
         <p:spPr>
           <a:xfrm>
             <a:off x="2319120" y="1645200"/>
-            <a:ext cx="6266880" cy="927000"/>
+            <a:ext cx="6266520" cy="926640"/>
           </a:xfrm>
           <a:prstGeom prst="rect">
             <a:avLst/>
@@ -18346,7 +18304,7 @@
         <p:txBody>
           <a:bodyPr lIns="90000" rIns="90000" tIns="45000" bIns="45000"/>
           <a:p>
-            <a:pPr marL="216000" indent="-215280" algn="just">
+            <a:pPr marL="216000" indent="-214920" algn="just">
               <a:lnSpc>
                 <a:spcPct val="100000"/>
               </a:lnSpc>
@@ -18384,7 +18342,7 @@
             </a:endParaRPr>
           </a:p>
           <a:p>
-            <a:pPr marL="216000" indent="-215280" algn="just">
+            <a:pPr marL="216000" indent="-214920" algn="just">
               <a:lnSpc>
                 <a:spcPct val="100000"/>
               </a:lnSpc>
@@ -18422,7 +18380,7 @@
             </a:endParaRPr>
           </a:p>
           <a:p>
-            <a:pPr marL="216000" indent="-215280" algn="just">
+            <a:pPr marL="216000" indent="-214920" algn="just">
               <a:lnSpc>
                 <a:spcPct val="100000"/>
               </a:lnSpc>
@@ -18460,7 +18418,7 @@
             </a:endParaRPr>
           </a:p>
           <a:p>
-            <a:pPr marL="219600" indent="-218880" algn="just">
+            <a:pPr marL="219600" indent="-218520" algn="just">
               <a:lnSpc>
                 <a:spcPct val="100000"/>
               </a:lnSpc>
@@ -18498,7 +18456,7 @@
             </a:endParaRPr>
           </a:p>
           <a:p>
-            <a:pPr marL="219600" indent="-218880" algn="just">
+            <a:pPr marL="219600" indent="-218520" algn="just">
               <a:lnSpc>
                 <a:spcPct val="100000"/>
               </a:lnSpc>
@@ -18564,7 +18522,7 @@
         <p:spPr>
           <a:xfrm>
             <a:off x="-6840" y="3474720"/>
-            <a:ext cx="2080800" cy="44280"/>
+            <a:ext cx="2080440" cy="43920"/>
           </a:xfrm>
           <a:prstGeom prst="rect">
             <a:avLst/>
@@ -18646,7 +18604,7 @@
         <p:spPr>
           <a:xfrm>
             <a:off x="2319120" y="501840"/>
-            <a:ext cx="4479120" cy="576720"/>
+            <a:ext cx="4478760" cy="576360"/>
           </a:xfrm>
           <a:prstGeom prst="rect">
             <a:avLst/>
@@ -18708,7 +18666,7 @@
         <p:spPr>
           <a:xfrm>
             <a:off x="2082240" y="1086840"/>
-            <a:ext cx="44280" cy="5789880"/>
+            <a:ext cx="43920" cy="5789520"/>
           </a:xfrm>
           <a:prstGeom prst="rect">
             <a:avLst/>
@@ -18741,7 +18699,7 @@
         <p:spPr>
           <a:xfrm>
             <a:off x="6553080" y="6356520"/>
-            <a:ext cx="2132280" cy="363600"/>
+            <a:ext cx="2131920" cy="363240"/>
           </a:xfrm>
           <a:prstGeom prst="rect">
             <a:avLst/>
@@ -18765,7 +18723,7 @@
                 <a:spcPct val="100000"/>
               </a:lnSpc>
             </a:pPr>
-            <a:fld id="{9CB58743-AAA4-4CD9-9986-EB93D708623E}" type="slidenum">
+            <a:fld id="{E26BF003-34F9-4BF2-8323-8E98DF75BB76}" type="slidenum">
               <a:rPr b="0" lang="en-US" sz="900" spc="-1" strike="noStrike">
                 <a:solidFill>
                   <a:srgbClr val="898c9d"/>
@@ -18778,7 +18736,7 @@
                 <a:latin typeface="Arial"/>
                 <a:ea typeface="DejaVu Sans"/>
               </a:rPr>
-              <a:t>1</a:t>
+              <a:t>&lt;number&gt;</a:t>
             </a:fld>
             <a:endParaRPr b="0" lang="en-US" sz="1800" spc="-1" strike="noStrike">
               <a:solidFill>
@@ -18803,7 +18761,7 @@
         <p:spPr>
           <a:xfrm>
             <a:off x="0" y="1673640"/>
-            <a:ext cx="2073960" cy="2859840"/>
+            <a:ext cx="2073600" cy="2859480"/>
           </a:xfrm>
           <a:prstGeom prst="rect">
             <a:avLst/>
@@ -19069,7 +19027,7 @@
         <p:spPr>
           <a:xfrm>
             <a:off x="2319120" y="1541160"/>
-            <a:ext cx="6266880" cy="927000"/>
+            <a:ext cx="6266520" cy="926640"/>
           </a:xfrm>
           <a:prstGeom prst="rect">
             <a:avLst/>
@@ -19263,7 +19221,7 @@
         <p:spPr>
           <a:xfrm>
             <a:off x="-6840" y="3474720"/>
-            <a:ext cx="2080800" cy="44280"/>
+            <a:ext cx="2080440" cy="43920"/>
           </a:xfrm>
           <a:prstGeom prst="rect">
             <a:avLst/>
@@ -19345,7 +19303,7 @@
         <p:spPr>
           <a:xfrm>
             <a:off x="2319120" y="501840"/>
-            <a:ext cx="4479120" cy="576720"/>
+            <a:ext cx="4478760" cy="576360"/>
           </a:xfrm>
           <a:prstGeom prst="rect">
             <a:avLst/>
@@ -19407,7 +19365,7 @@
         <p:spPr>
           <a:xfrm>
             <a:off x="2082240" y="1086840"/>
-            <a:ext cx="44280" cy="5789880"/>
+            <a:ext cx="43920" cy="5789520"/>
           </a:xfrm>
           <a:prstGeom prst="rect">
             <a:avLst/>
@@ -19440,7 +19398,7 @@
         <p:spPr>
           <a:xfrm>
             <a:off x="6553080" y="6356520"/>
-            <a:ext cx="2132280" cy="363600"/>
+            <a:ext cx="2131920" cy="363240"/>
           </a:xfrm>
           <a:prstGeom prst="rect">
             <a:avLst/>
@@ -19464,7 +19422,7 @@
                 <a:spcPct val="100000"/>
               </a:lnSpc>
             </a:pPr>
-            <a:fld id="{9349FB34-C176-49E7-966D-AC096ABA42D6}" type="slidenum">
+            <a:fld id="{1BEA680A-FCE2-4595-B089-696DDFEA84B3}" type="slidenum">
               <a:rPr b="0" lang="en-US" sz="900" spc="-1" strike="noStrike">
                 <a:solidFill>
                   <a:srgbClr val="898c9d"/>
@@ -19477,7 +19435,7 @@
                 <a:latin typeface="Arial"/>
                 <a:ea typeface="DejaVu Sans"/>
               </a:rPr>
-              <a:t>1</a:t>
+              <a:t>&lt;number&gt;</a:t>
             </a:fld>
             <a:endParaRPr b="0" lang="en-US" sz="1800" spc="-1" strike="noStrike">
               <a:solidFill>
@@ -19502,7 +19460,7 @@
         <p:spPr>
           <a:xfrm>
             <a:off x="0" y="1673640"/>
-            <a:ext cx="2073960" cy="2859840"/>
+            <a:ext cx="2073600" cy="2859480"/>
           </a:xfrm>
           <a:prstGeom prst="rect">
             <a:avLst/>
@@ -19768,7 +19726,7 @@
         <p:spPr>
           <a:xfrm>
             <a:off x="2319120" y="1541160"/>
-            <a:ext cx="6266880" cy="927000"/>
+            <a:ext cx="6266520" cy="926640"/>
           </a:xfrm>
           <a:prstGeom prst="rect">
             <a:avLst/>
@@ -19866,7 +19824,7 @@
         <p:spPr>
           <a:xfrm>
             <a:off x="-6840" y="3474720"/>
-            <a:ext cx="2080800" cy="44280"/>
+            <a:ext cx="2080440" cy="43920"/>
           </a:xfrm>
           <a:prstGeom prst="rect">
             <a:avLst/>
@@ -19903,7 +19861,7 @@
         <p:spPr>
           <a:xfrm>
             <a:off x="4663440" y="2834640"/>
-            <a:ext cx="2194200" cy="2194200"/>
+            <a:ext cx="2193840" cy="2193840"/>
           </a:xfrm>
           <a:prstGeom prst="rect">
             <a:avLst/>

</xml_diff>